<commit_message>
Updates the ppt and adds an element height into the reordableList.
</commit_message>
<xml_diff>
--- a/Editor Scripting in Unity.pptx
+++ b/Editor Scripting in Unity.pptx
@@ -11,13 +11,17 @@
     <p:sldId id="259" r:id="rId5"/>
     <p:sldId id="260" r:id="rId6"/>
     <p:sldId id="261" r:id="rId7"/>
-    <p:sldId id="262" r:id="rId8"/>
-    <p:sldId id="263" r:id="rId9"/>
-    <p:sldId id="264" r:id="rId10"/>
-    <p:sldId id="265" r:id="rId11"/>
-    <p:sldId id="266" r:id="rId12"/>
-    <p:sldId id="267" r:id="rId13"/>
-    <p:sldId id="268" r:id="rId14"/>
+    <p:sldId id="270" r:id="rId8"/>
+    <p:sldId id="262" r:id="rId9"/>
+    <p:sldId id="271" r:id="rId10"/>
+    <p:sldId id="263" r:id="rId11"/>
+    <p:sldId id="272" r:id="rId12"/>
+    <p:sldId id="264" r:id="rId13"/>
+    <p:sldId id="269" r:id="rId14"/>
+    <p:sldId id="265" r:id="rId15"/>
+    <p:sldId id="266" r:id="rId16"/>
+    <p:sldId id="267" r:id="rId17"/>
+    <p:sldId id="268" r:id="rId18"/>
   </p:sldIdLst>
   <p:sldSz cx="12192000" cy="6858000"/>
   <p:notesSz cx="6858000" cy="9144000"/>
@@ -116,7 +120,16 @@
       </a:defRPr>
     </a:lvl9pPr>
   </p:defaultTextStyle>
+  <p:extLst>
+    <p:ext uri="{EFAFB233-063F-42B5-8137-9DF3F51BA10A}">
+      <p15:sldGuideLst xmlns:p15="http://schemas.microsoft.com/office/powerpoint/2012/main"/>
+    </p:ext>
+  </p:extLst>
 </p:presentation>
+</file>
+
+<file path=ppt/revisionInfo.xml><?xml version="1.0" encoding="utf-8"?>
+<p1510:revInfo xmlns:a="http://schemas.openxmlformats.org/drawingml/2006/main" xmlns:r="http://schemas.openxmlformats.org/officeDocument/2006/relationships" xmlns:p1510="http://schemas.microsoft.com/office/powerpoint/2015/10/main"/>
 </file>
 
 <file path=ppt/slideLayouts/slideLayout1.xml><?xml version="1.0" encoding="utf-8"?>
@@ -214,7 +227,7 @@
           <a:effectLst/>
           <a:extLst>
             <a:ext uri="{91240B29-F687-4f45-9708-019B960494DF}">
-              <a14:hiddenLine xmlns:a14="http://schemas.microsoft.com/office/drawing/2010/main" xmlns="" w="9525">
+              <a14:hiddenLine xmlns="" xmlns:a14="http://schemas.microsoft.com/office/drawing/2010/main" w="9525">
                 <a:solidFill>
                   <a:srgbClr val="000000"/>
                 </a:solidFill>
@@ -407,7 +420,7 @@
             <a:fld id="{08B9EBBA-996F-894A-B54A-D6246ED52CEA}" type="datetimeFigureOut">
               <a:rPr lang="en-US" dirty="0"/>
               <a:pPr/>
-              <a:t>5/7/2017</a:t>
+              <a:t>5/9/2017</a:t>
             </a:fld>
             <a:endParaRPr lang="en-US" dirty="0"/>
           </a:p>
@@ -722,7 +735,7 @@
             <a:fld id="{18C79C5D-2A6F-F04D-97DA-BEF2467B64E4}" type="datetimeFigureOut">
               <a:rPr lang="en-US" dirty="0"/>
               <a:pPr/>
-              <a:t>5/7/2017</a:t>
+              <a:t>5/9/2017</a:t>
             </a:fld>
             <a:endParaRPr lang="en-US" dirty="0"/>
           </a:p>
@@ -1207,7 +1220,7 @@
             <a:fld id="{8DFA1846-DA80-1C48-A609-854EA85C59AD}" type="datetimeFigureOut">
               <a:rPr lang="en-US" dirty="0"/>
               <a:pPr/>
-              <a:t>5/7/2017</a:t>
+              <a:t>5/9/2017</a:t>
             </a:fld>
             <a:endParaRPr lang="en-US" dirty="0"/>
           </a:p>
@@ -1573,7 +1586,7 @@
             <a:fld id="{FBF54567-0DE4-3F47-BF90-CB84690072F9}" type="datetimeFigureOut">
               <a:rPr lang="en-US" dirty="0"/>
               <a:pPr/>
-              <a:t>5/7/2017</a:t>
+              <a:t>5/9/2017</a:t>
             </a:fld>
             <a:endParaRPr lang="en-US" dirty="0"/>
           </a:p>
@@ -1724,7 +1737,7 @@
           <a:ln/>
           <a:extLst>
             <a:ext uri="{91240B29-F687-4f45-9708-019B960494DF}">
-              <a14:hiddenLine xmlns:a14="http://schemas.microsoft.com/office/drawing/2010/main" xmlns="" w="9525">
+              <a14:hiddenLine xmlns="" xmlns:a14="http://schemas.microsoft.com/office/drawing/2010/main" w="9525">
                 <a:solidFill>
                   <a:srgbClr val="000000"/>
                 </a:solidFill>
@@ -1843,7 +1856,7 @@
             <a:fld id="{C6C52C72-DE31-F449-A4ED-4C594FD91407}" type="datetimeFigureOut">
               <a:rPr lang="en-US" dirty="0"/>
               <a:pPr/>
-              <a:t>5/7/2017</a:t>
+              <a:t>5/9/2017</a:t>
             </a:fld>
             <a:endParaRPr lang="en-US" dirty="0"/>
           </a:p>
@@ -1996,7 +2009,7 @@
           <a:ln/>
           <a:extLst>
             <a:ext uri="{91240B29-F687-4f45-9708-019B960494DF}">
-              <a14:hiddenLine xmlns:a14="http://schemas.microsoft.com/office/drawing/2010/main" xmlns="" w="9525">
+              <a14:hiddenLine xmlns="" xmlns:a14="http://schemas.microsoft.com/office/drawing/2010/main" w="9525">
                 <a:solidFill>
                   <a:srgbClr val="000000"/>
                 </a:solidFill>
@@ -2125,7 +2138,7 @@
             <a:fld id="{ED62726E-379B-B349-9EED-81ED093FA806}" type="datetimeFigureOut">
               <a:rPr lang="en-US" dirty="0"/>
               <a:pPr/>
-              <a:t>5/7/2017</a:t>
+              <a:t>5/9/2017</a:t>
             </a:fld>
             <a:endParaRPr lang="en-US" dirty="0"/>
           </a:p>
@@ -2276,7 +2289,7 @@
           <a:ln/>
           <a:extLst>
             <a:ext uri="{91240B29-F687-4f45-9708-019B960494DF}">
-              <a14:hiddenLine xmlns:a14="http://schemas.microsoft.com/office/drawing/2010/main" xmlns="" w="9525">
+              <a14:hiddenLine xmlns="" xmlns:a14="http://schemas.microsoft.com/office/drawing/2010/main" w="9525">
                 <a:solidFill>
                   <a:srgbClr val="000000"/>
                 </a:solidFill>
@@ -2405,7 +2418,7 @@
             <a:fld id="{9B3A1323-8D79-1946-B0D7-40001CF92E9D}" type="datetimeFigureOut">
               <a:rPr lang="en-US" dirty="0"/>
               <a:pPr/>
-              <a:t>5/7/2017</a:t>
+              <a:t>5/9/2017</a:t>
             </a:fld>
             <a:endParaRPr lang="en-US" dirty="0"/>
           </a:p>
@@ -2745,7 +2758,7 @@
             <a:fld id="{8DFA1846-DA80-1C48-A609-854EA85C59AD}" type="datetimeFigureOut">
               <a:rPr lang="en-US" dirty="0"/>
               <a:pPr/>
-              <a:t>5/7/2017</a:t>
+              <a:t>5/9/2017</a:t>
             </a:fld>
             <a:endParaRPr lang="en-US" dirty="0"/>
           </a:p>
@@ -2896,7 +2909,7 @@
           <a:ln/>
           <a:extLst>
             <a:ext uri="{91240B29-F687-4f45-9708-019B960494DF}">
-              <a14:hiddenLine xmlns:a14="http://schemas.microsoft.com/office/drawing/2010/main" xmlns="" w="9525">
+              <a14:hiddenLine xmlns="" xmlns:a14="http://schemas.microsoft.com/office/drawing/2010/main" w="9525">
                 <a:solidFill>
                   <a:srgbClr val="000000"/>
                 </a:solidFill>
@@ -3081,7 +3094,7 @@
             <a:fld id="{57302355-E14B-8545-A8F8-0FE83CC9D524}" type="datetimeFigureOut">
               <a:rPr lang="en-US" dirty="0"/>
               <a:pPr/>
-              <a:t>5/7/2017</a:t>
+              <a:t>5/9/2017</a:t>
             </a:fld>
             <a:endParaRPr lang="en-US" dirty="0"/>
           </a:p>
@@ -3232,7 +3245,7 @@
           <a:ln/>
           <a:extLst>
             <a:ext uri="{91240B29-F687-4f45-9708-019B960494DF}">
-              <a14:hiddenLine xmlns:a14="http://schemas.microsoft.com/office/drawing/2010/main" xmlns="" w="9525">
+              <a14:hiddenLine xmlns="" xmlns:a14="http://schemas.microsoft.com/office/drawing/2010/main" w="9525">
                 <a:solidFill>
                   <a:srgbClr val="000000"/>
                 </a:solidFill>
@@ -3555,7 +3568,7 @@
             <a:fld id="{02640F58-564D-2B4F-AE67-E407BA4FCF45}" type="datetimeFigureOut">
               <a:rPr lang="en-US" dirty="0"/>
               <a:pPr/>
-              <a:t>5/7/2017</a:t>
+              <a:t>5/9/2017</a:t>
             </a:fld>
             <a:endParaRPr lang="en-US" dirty="0"/>
           </a:p>
@@ -3706,7 +3719,7 @@
           <a:ln/>
           <a:extLst>
             <a:ext uri="{91240B29-F687-4f45-9708-019B960494DF}">
-              <a14:hiddenLine xmlns:a14="http://schemas.microsoft.com/office/drawing/2010/main" xmlns="" w="9525">
+              <a14:hiddenLine xmlns="" xmlns:a14="http://schemas.microsoft.com/office/drawing/2010/main" w="9525">
                 <a:solidFill>
                   <a:srgbClr val="000000"/>
                 </a:solidFill>
@@ -3773,7 +3786,7 @@
             <a:fld id="{F13A34C8-038E-2045-AF43-DF7DBB8E0E9E}" type="datetimeFigureOut">
               <a:rPr lang="en-US" dirty="0"/>
               <a:pPr/>
-              <a:t>5/7/2017</a:t>
+              <a:t>5/9/2017</a:t>
             </a:fld>
             <a:endParaRPr lang="en-US" dirty="0"/>
           </a:p>
@@ -3865,7 +3878,7 @@
             <a:fld id="{8818C68F-D26B-8F47-958C-23B49CF8A634}" type="datetimeFigureOut">
               <a:rPr lang="en-US" dirty="0"/>
               <a:pPr/>
-              <a:t>5/7/2017</a:t>
+              <a:t>5/9/2017</a:t>
             </a:fld>
             <a:endParaRPr lang="en-US" dirty="0"/>
           </a:p>
@@ -4129,7 +4142,7 @@
           <a:ln/>
           <a:extLst>
             <a:ext uri="{91240B29-F687-4f45-9708-019B960494DF}">
-              <a14:hiddenLine xmlns:a14="http://schemas.microsoft.com/office/drawing/2010/main" xmlns="" w="9525">
+              <a14:hiddenLine xmlns="" xmlns:a14="http://schemas.microsoft.com/office/drawing/2010/main" w="9525">
                 <a:solidFill>
                   <a:srgbClr val="000000"/>
                 </a:solidFill>
@@ -4329,7 +4342,7 @@
             <a:fld id="{D0DF5E60-9974-AC48-9591-99C2BB44B7CF}" type="datetimeFigureOut">
               <a:rPr lang="en-US" dirty="0"/>
               <a:pPr/>
-              <a:t>5/7/2017</a:t>
+              <a:t>5/9/2017</a:t>
             </a:fld>
             <a:endParaRPr lang="en-US" dirty="0"/>
           </a:p>
@@ -4639,7 +4652,7 @@
             <a:fld id="{18C79C5D-2A6F-F04D-97DA-BEF2467B64E4}" type="datetimeFigureOut">
               <a:rPr lang="en-US" dirty="0"/>
               <a:pPr/>
-              <a:t>5/7/2017</a:t>
+              <a:t>5/9/2017</a:t>
             </a:fld>
             <a:endParaRPr lang="en-US" dirty="0"/>
           </a:p>
@@ -4906,7 +4919,7 @@
             <a:fld id="{09B482E8-6E0E-1B4F-B1FD-C69DB9E858D9}" type="datetimeFigureOut">
               <a:rPr lang="en-US" dirty="0"/>
               <a:pPr/>
-              <a:t>5/7/2017</a:t>
+              <a:t>5/9/2017</a:t>
             </a:fld>
             <a:endParaRPr lang="en-US" dirty="0"/>
           </a:p>
@@ -5443,7 +5456,7 @@
           <a:p>
             <a:r>
               <a:rPr lang="en-US" dirty="0"/>
-              <a:t>Delegates</a:t>
+              <a:t>Editor Scripting Outline</a:t>
             </a:r>
           </a:p>
         </p:txBody>
@@ -5465,113 +5478,78 @@
           <a:p>
             <a:r>
               <a:rPr lang="en-US" dirty="0"/>
-              <a:t>These are functions – which may contain functionality of many different functions</a:t>
-            </a:r>
-          </a:p>
-          <a:p>
-            <a:r>
-              <a:rPr lang="en-US" dirty="0"/>
-              <a:t>If you’re used to C++ then they are similar to function pointers</a:t>
-            </a:r>
-          </a:p>
-          <a:p>
-            <a:pPr lvl="1"/>
-            <a:r>
-              <a:rPr lang="en-US" dirty="0">
-                <a:latin typeface="Consolas" panose="020B0609020204030204" pitchFamily="49" charset="0"/>
-              </a:rPr>
-              <a:t>void *</a:t>
-            </a:r>
-            <a:r>
-              <a:rPr lang="en-US" dirty="0" err="1">
-                <a:latin typeface="Consolas" panose="020B0609020204030204" pitchFamily="49" charset="0"/>
-              </a:rPr>
-              <a:t>some_cpp_function</a:t>
-            </a:r>
-            <a:r>
-              <a:rPr lang="en-US" dirty="0">
-                <a:latin typeface="Consolas" panose="020B0609020204030204" pitchFamily="49" charset="0"/>
-              </a:rPr>
-              <a:t>();</a:t>
-            </a:r>
-          </a:p>
-          <a:p>
-            <a:r>
-              <a:rPr lang="en-US" dirty="0">
-                <a:latin typeface="+mj-lt"/>
-              </a:rPr>
-              <a:t>Otherwise, imagine a container with the same type of functions and parameters:</a:t>
-            </a:r>
-          </a:p>
-          <a:p>
-            <a:pPr lvl="1"/>
-            <a:r>
-              <a:rPr lang="en-US" dirty="0">
-                <a:latin typeface="Consolas" panose="020B0609020204030204" pitchFamily="49" charset="0"/>
-              </a:rPr>
-              <a:t>[ void function_1(</a:t>
-            </a:r>
-            <a:r>
-              <a:rPr lang="en-US" dirty="0" err="1">
-                <a:latin typeface="Consolas" panose="020B0609020204030204" pitchFamily="49" charset="0"/>
-              </a:rPr>
-              <a:t>int</a:t>
-            </a:r>
-            <a:r>
-              <a:rPr lang="en-US" dirty="0">
-                <a:latin typeface="Consolas" panose="020B0609020204030204" pitchFamily="49" charset="0"/>
-              </a:rPr>
-              <a:t>), void function_2(</a:t>
-            </a:r>
-            <a:r>
-              <a:rPr lang="en-US" dirty="0" err="1">
-                <a:latin typeface="Consolas" panose="020B0609020204030204" pitchFamily="49" charset="0"/>
-              </a:rPr>
-              <a:t>int</a:t>
-            </a:r>
-            <a:r>
-              <a:rPr lang="en-US" dirty="0">
-                <a:latin typeface="Consolas" panose="020B0609020204030204" pitchFamily="49" charset="0"/>
-              </a:rPr>
-              <a:t>), void function_3(</a:t>
-            </a:r>
-            <a:r>
-              <a:rPr lang="en-US" dirty="0" err="1">
-                <a:latin typeface="Consolas" panose="020B0609020204030204" pitchFamily="49" charset="0"/>
-              </a:rPr>
-              <a:t>int</a:t>
-            </a:r>
-            <a:r>
-              <a:rPr lang="en-US" dirty="0">
-                <a:latin typeface="Consolas" panose="020B0609020204030204" pitchFamily="49" charset="0"/>
-              </a:rPr>
-              <a:t>) ]</a:t>
-            </a:r>
-          </a:p>
-          <a:p>
-            <a:pPr lvl="1"/>
-            <a:r>
-              <a:rPr lang="en-US" dirty="0">
-                <a:latin typeface="+mj-lt"/>
-              </a:rPr>
-              <a:t>We can invoke all of them without directly calling them!</a:t>
-            </a:r>
-          </a:p>
-          <a:p>
-            <a:pPr lvl="1"/>
-            <a:r>
-              <a:rPr lang="en-US" dirty="0">
-                <a:latin typeface="+mj-lt"/>
-              </a:rPr>
-              <a:t>Useful for event based programming – which is editor scripting</a:t>
-            </a:r>
-          </a:p>
-          <a:p>
-            <a:r>
-              <a:rPr lang="en-US" dirty="0">
-                <a:latin typeface="+mj-lt"/>
-              </a:rPr>
-              <a:t>A function can be added to a delegate using the += operator</a:t>
+              <a:t>Your class must derive from the </a:t>
+            </a:r>
+            <a:r>
+              <a:rPr lang="en-US" b="1" dirty="0"/>
+              <a:t>Editor</a:t>
+            </a:r>
+            <a:r>
+              <a:rPr lang="en-US" dirty="0"/>
+              <a:t> class, not </a:t>
+            </a:r>
+            <a:r>
+              <a:rPr lang="en-US" b="1" dirty="0" err="1"/>
+              <a:t>MonoBehaviour</a:t>
+            </a:r>
+            <a:endParaRPr lang="en-US" dirty="0"/>
+          </a:p>
+          <a:p>
+            <a:r>
+              <a:rPr lang="en-US" dirty="0"/>
+              <a:t>Use </a:t>
+            </a:r>
+            <a:r>
+              <a:rPr lang="en-US" b="1" dirty="0" err="1"/>
+              <a:t>OnEnable</a:t>
+            </a:r>
+            <a:r>
+              <a:rPr lang="en-US" b="1" dirty="0"/>
+              <a:t>()</a:t>
+            </a:r>
+            <a:r>
+              <a:rPr lang="en-US" dirty="0"/>
+              <a:t> and </a:t>
+            </a:r>
+            <a:r>
+              <a:rPr lang="en-US" b="1" dirty="0" err="1"/>
+              <a:t>OnDisable</a:t>
+            </a:r>
+            <a:r>
+              <a:rPr lang="en-US" b="1" dirty="0"/>
+              <a:t>()</a:t>
+            </a:r>
+            <a:r>
+              <a:rPr lang="en-US" dirty="0"/>
+              <a:t> as your constructor and destructor</a:t>
+            </a:r>
+          </a:p>
+          <a:p>
+            <a:r>
+              <a:rPr lang="en-US" dirty="0"/>
+              <a:t>Always use </a:t>
+            </a:r>
+            <a:r>
+              <a:rPr lang="en-US" b="1" dirty="0" err="1"/>
+              <a:t>UnityEditor</a:t>
+            </a:r>
+            <a:r>
+              <a:rPr lang="en-US" b="1" dirty="0"/>
+              <a:t> </a:t>
+            </a:r>
+            <a:r>
+              <a:rPr lang="en-US" dirty="0"/>
+              <a:t>namespace</a:t>
+            </a:r>
+          </a:p>
+          <a:p>
+            <a:r>
+              <a:rPr lang="en-US" b="1" dirty="0" err="1"/>
+              <a:t>UnityEditorInternal</a:t>
+            </a:r>
+            <a:r>
+              <a:rPr lang="en-US" dirty="0"/>
+              <a:t> namespace is optional (this is undocumented)</a:t>
             </a:r>
           </a:p>
         </p:txBody>
@@ -5579,7 +5557,7 @@
     </p:spTree>
     <p:extLst>
       <p:ext uri="{BB962C8B-B14F-4D97-AF65-F5344CB8AC3E}">
-        <p14:creationId xmlns:p14="http://schemas.microsoft.com/office/powerpoint/2010/main" val="3693195828"/>
+        <p14:creationId xmlns:p14="http://schemas.microsoft.com/office/powerpoint/2010/main" val="2620307603"/>
       </p:ext>
     </p:extLst>
   </p:cSld>
@@ -5623,7 +5601,7 @@
           <a:p>
             <a:r>
               <a:rPr lang="en-US" dirty="0"/>
-              <a:t>Lambdas</a:t>
+              <a:t>Editor Scripting Outline Cont.</a:t>
             </a:r>
           </a:p>
         </p:txBody>
@@ -5645,101 +5623,77 @@
           <a:p>
             <a:r>
               <a:rPr lang="en-US" dirty="0"/>
-              <a:t>Lambdas are anonymous functions – functions without an explicit function definition</a:t>
-            </a:r>
-          </a:p>
-          <a:p>
-            <a:r>
-              <a:rPr lang="en-US" dirty="0"/>
-              <a:t>Example:</a:t>
-            </a:r>
-          </a:p>
-          <a:p>
-            <a:pPr lvl="1"/>
-            <a:r>
-              <a:rPr lang="en-US" dirty="0">
-                <a:latin typeface="Consolas" panose="020B0609020204030204" pitchFamily="49" charset="0"/>
-              </a:rPr>
-              <a:t>EXPLICIT: void add(</a:t>
-            </a:r>
-            <a:r>
-              <a:rPr lang="en-US" dirty="0" err="1">
-                <a:latin typeface="Consolas" panose="020B0609020204030204" pitchFamily="49" charset="0"/>
-              </a:rPr>
-              <a:t>int</a:t>
-            </a:r>
-            <a:r>
-              <a:rPr lang="en-US" dirty="0">
-                <a:latin typeface="Consolas" panose="020B0609020204030204" pitchFamily="49" charset="0"/>
-              </a:rPr>
-              <a:t> a, </a:t>
-            </a:r>
-            <a:r>
-              <a:rPr lang="en-US" dirty="0" err="1">
-                <a:latin typeface="Consolas" panose="020B0609020204030204" pitchFamily="49" charset="0"/>
-              </a:rPr>
-              <a:t>int</a:t>
-            </a:r>
-            <a:r>
-              <a:rPr lang="en-US" dirty="0">
-                <a:latin typeface="Consolas" panose="020B0609020204030204" pitchFamily="49" charset="0"/>
-              </a:rPr>
-              <a:t> b) { return a + b; }</a:t>
-            </a:r>
-          </a:p>
-          <a:p>
-            <a:pPr lvl="1"/>
-            <a:r>
-              <a:rPr lang="en-US" dirty="0">
-                <a:latin typeface="Consolas" panose="020B0609020204030204" pitchFamily="49" charset="0"/>
-              </a:rPr>
-              <a:t>IMPLICIT: (</a:t>
-            </a:r>
-            <a:r>
-              <a:rPr lang="en-US" dirty="0" err="1">
-                <a:latin typeface="Consolas" panose="020B0609020204030204" pitchFamily="49" charset="0"/>
-              </a:rPr>
-              <a:t>int</a:t>
-            </a:r>
-            <a:r>
-              <a:rPr lang="en-US" dirty="0">
-                <a:latin typeface="Consolas" panose="020B0609020204030204" pitchFamily="49" charset="0"/>
-              </a:rPr>
-              <a:t> a, </a:t>
-            </a:r>
-            <a:r>
-              <a:rPr lang="en-US" dirty="0" err="1">
-                <a:latin typeface="Consolas" panose="020B0609020204030204" pitchFamily="49" charset="0"/>
-              </a:rPr>
-              <a:t>int</a:t>
-            </a:r>
-            <a:r>
-              <a:rPr lang="en-US" dirty="0">
-                <a:latin typeface="Consolas" panose="020B0609020204030204" pitchFamily="49" charset="0"/>
-              </a:rPr>
-              <a:t> b) =&gt; { return a + b };</a:t>
-            </a:r>
-          </a:p>
-          <a:p>
-            <a:r>
-              <a:rPr lang="en-US" dirty="0">
-                <a:latin typeface="+mj-lt"/>
-              </a:rPr>
-              <a:t>Lambdas are short hands for writing functionalities into delegates, but fundamentally they are functions!</a:t>
-            </a:r>
-          </a:p>
-          <a:p>
-            <a:pPr lvl="1"/>
-            <a:endParaRPr lang="en-US" dirty="0">
-              <a:latin typeface="Consolas" panose="020B0609020204030204" pitchFamily="49" charset="0"/>
-            </a:endParaRPr>
+              <a:t>To override the Inspector – override </a:t>
+            </a:r>
+            <a:r>
+              <a:rPr lang="en-US" b="1" dirty="0" err="1">
+                <a:latin typeface="Consolas" panose="020B0609020204030204" pitchFamily="49" charset="0"/>
+              </a:rPr>
+              <a:t>OnInspectorGUI</a:t>
+            </a:r>
+            <a:r>
+              <a:rPr lang="en-US" b="1" dirty="0">
+                <a:latin typeface="Consolas" panose="020B0609020204030204" pitchFamily="49" charset="0"/>
+              </a:rPr>
+              <a:t>()</a:t>
+            </a:r>
+          </a:p>
+          <a:p>
+            <a:r>
+              <a:rPr lang="en-US" dirty="0"/>
+              <a:t>To override the </a:t>
+            </a:r>
+            <a:r>
+              <a:rPr lang="en-US" dirty="0" err="1"/>
+              <a:t>SceneView</a:t>
+            </a:r>
+            <a:r>
+              <a:rPr lang="en-US" dirty="0"/>
+              <a:t> Editor – override </a:t>
+            </a:r>
+            <a:r>
+              <a:rPr lang="en-US" b="1" dirty="0" err="1">
+                <a:latin typeface="Consolas" panose="020B0609020204030204" pitchFamily="49" charset="0"/>
+              </a:rPr>
+              <a:t>OnSceneGUI</a:t>
+            </a:r>
+            <a:r>
+              <a:rPr lang="en-US" b="1" dirty="0">
+                <a:latin typeface="Consolas" panose="020B0609020204030204" pitchFamily="49" charset="0"/>
+              </a:rPr>
+              <a:t>(</a:t>
+            </a:r>
+            <a:r>
+              <a:rPr lang="en-US" b="1" dirty="0" err="1">
+                <a:latin typeface="Consolas" panose="020B0609020204030204" pitchFamily="49" charset="0"/>
+              </a:rPr>
+              <a:t>SceneView</a:t>
+            </a:r>
+            <a:r>
+              <a:rPr lang="en-US" b="1" dirty="0">
+                <a:latin typeface="Consolas" panose="020B0609020204030204" pitchFamily="49" charset="0"/>
+              </a:rPr>
+              <a:t> </a:t>
+            </a:r>
+            <a:r>
+              <a:rPr lang="en-US" b="1" dirty="0" err="1">
+                <a:latin typeface="Consolas" panose="020B0609020204030204" pitchFamily="49" charset="0"/>
+              </a:rPr>
+              <a:t>sceneView</a:t>
+            </a:r>
+            <a:r>
+              <a:rPr lang="en-US" b="1" dirty="0">
+                <a:latin typeface="Consolas" panose="020B0609020204030204" pitchFamily="49" charset="0"/>
+              </a:rPr>
+              <a:t>)</a:t>
+            </a:r>
           </a:p>
         </p:txBody>
       </p:sp>
     </p:spTree>
     <p:extLst>
       <p:ext uri="{BB962C8B-B14F-4D97-AF65-F5344CB8AC3E}">
-        <p14:creationId xmlns:p14="http://schemas.microsoft.com/office/powerpoint/2010/main" val="1942837319"/>
+        <p14:creationId xmlns:p14="http://schemas.microsoft.com/office/powerpoint/2010/main" val="2878490534"/>
       </p:ext>
     </p:extLst>
   </p:cSld>
@@ -5783,6 +5737,1173 @@
           <a:p>
             <a:r>
               <a:rPr lang="en-US" dirty="0"/>
+              <a:t>Template for Inspector Editor Scripting</a:t>
+            </a:r>
+          </a:p>
+        </p:txBody>
+      </p:sp>
+      <p:sp>
+        <p:nvSpPr>
+          <p:cNvPr id="3" name="Content Placeholder 2"/>
+          <p:cNvSpPr>
+            <a:spLocks noGrp="1"/>
+          </p:cNvSpPr>
+          <p:nvPr>
+            <p:ph idx="1"/>
+          </p:nvPr>
+        </p:nvSpPr>
+        <p:spPr>
+          <a:xfrm>
+            <a:off x="818712" y="2072081"/>
+            <a:ext cx="10554574" cy="4664279"/>
+          </a:xfrm>
+        </p:spPr>
+        <p:txBody>
+          <a:bodyPr>
+            <a:normAutofit fontScale="85000" lnSpcReduction="20000"/>
+          </a:bodyPr>
+          <a:lstStyle/>
+          <a:p>
+            <a:pPr marL="0" indent="0">
+              <a:buNone/>
+            </a:pPr>
+            <a:r>
+              <a:rPr lang="en-US" sz="1200" dirty="0">
+                <a:latin typeface="Consolas" panose="020B0609020204030204" pitchFamily="49" charset="0"/>
+              </a:rPr>
+              <a:t>using </a:t>
+            </a:r>
+            <a:r>
+              <a:rPr lang="en-US" sz="1200" dirty="0" err="1">
+                <a:latin typeface="Consolas" panose="020B0609020204030204" pitchFamily="49" charset="0"/>
+              </a:rPr>
+              <a:t>UnityEditor</a:t>
+            </a:r>
+            <a:r>
+              <a:rPr lang="en-US" sz="1200" dirty="0">
+                <a:latin typeface="Consolas" panose="020B0609020204030204" pitchFamily="49" charset="0"/>
+              </a:rPr>
+              <a:t>;</a:t>
+            </a:r>
+          </a:p>
+          <a:p>
+            <a:pPr marL="0" indent="0">
+              <a:buNone/>
+            </a:pPr>
+            <a:r>
+              <a:rPr lang="en-US" sz="1200" dirty="0">
+                <a:latin typeface="Consolas" panose="020B0609020204030204" pitchFamily="49" charset="0"/>
+              </a:rPr>
+              <a:t>using </a:t>
+            </a:r>
+            <a:r>
+              <a:rPr lang="en-US" sz="1200" dirty="0" err="1">
+                <a:latin typeface="Consolas" panose="020B0609020204030204" pitchFamily="49" charset="0"/>
+              </a:rPr>
+              <a:t>UnityEditorInternal</a:t>
+            </a:r>
+            <a:r>
+              <a:rPr lang="en-US" sz="1200" dirty="0">
+                <a:latin typeface="Consolas" panose="020B0609020204030204" pitchFamily="49" charset="0"/>
+              </a:rPr>
+              <a:t>;</a:t>
+            </a:r>
+          </a:p>
+          <a:p>
+            <a:pPr marL="0" indent="0">
+              <a:buNone/>
+            </a:pPr>
+            <a:r>
+              <a:rPr lang="en-US" sz="1200" dirty="0">
+                <a:latin typeface="Consolas" panose="020B0609020204030204" pitchFamily="49" charset="0"/>
+              </a:rPr>
+              <a:t>using </a:t>
+            </a:r>
+            <a:r>
+              <a:rPr lang="en-US" sz="1200" dirty="0" err="1">
+                <a:latin typeface="Consolas" panose="020B0609020204030204" pitchFamily="49" charset="0"/>
+              </a:rPr>
+              <a:t>UnityEngine</a:t>
+            </a:r>
+            <a:r>
+              <a:rPr lang="en-US" sz="1200" dirty="0">
+                <a:latin typeface="Consolas" panose="020B0609020204030204" pitchFamily="49" charset="0"/>
+              </a:rPr>
+              <a:t>;</a:t>
+            </a:r>
+          </a:p>
+          <a:p>
+            <a:pPr marL="0" indent="0">
+              <a:buNone/>
+            </a:pPr>
+            <a:endParaRPr lang="en-US" sz="1200" dirty="0">
+              <a:latin typeface="Consolas" panose="020B0609020204030204" pitchFamily="49" charset="0"/>
+            </a:endParaRPr>
+          </a:p>
+          <a:p>
+            <a:pPr marL="0" indent="0">
+              <a:buNone/>
+            </a:pPr>
+            <a:r>
+              <a:rPr lang="en-US" sz="1200" dirty="0">
+                <a:latin typeface="Consolas" panose="020B0609020204030204" pitchFamily="49" charset="0"/>
+              </a:rPr>
+              <a:t>public class </a:t>
+            </a:r>
+            <a:r>
+              <a:rPr lang="en-US" sz="1200" dirty="0" err="1">
+                <a:latin typeface="Consolas" panose="020B0609020204030204" pitchFamily="49" charset="0"/>
+              </a:rPr>
+              <a:t>EditorSample</a:t>
+            </a:r>
+            <a:r>
+              <a:rPr lang="en-US" sz="1200" dirty="0">
+                <a:latin typeface="Consolas" panose="020B0609020204030204" pitchFamily="49" charset="0"/>
+              </a:rPr>
+              <a:t> : Editor {</a:t>
+            </a:r>
+          </a:p>
+          <a:p>
+            <a:pPr marL="0" indent="0">
+              <a:buNone/>
+            </a:pPr>
+            <a:r>
+              <a:rPr lang="en-US" sz="1200" dirty="0">
+                <a:latin typeface="Consolas" panose="020B0609020204030204" pitchFamily="49" charset="0"/>
+              </a:rPr>
+              <a:t>	private </a:t>
+            </a:r>
+            <a:r>
+              <a:rPr lang="en-US" sz="1200" dirty="0" err="1">
+                <a:latin typeface="Consolas" panose="020B0609020204030204" pitchFamily="49" charset="0"/>
+              </a:rPr>
+              <a:t>SerializeProperty</a:t>
+            </a:r>
+            <a:r>
+              <a:rPr lang="en-US" sz="1200" dirty="0">
+                <a:latin typeface="Consolas" panose="020B0609020204030204" pitchFamily="49" charset="0"/>
+              </a:rPr>
+              <a:t> property; // Reference to the Serialized Property</a:t>
+            </a:r>
+          </a:p>
+          <a:p>
+            <a:pPr marL="0" indent="0">
+              <a:buNone/>
+            </a:pPr>
+            <a:r>
+              <a:rPr lang="en-US" sz="1200" dirty="0">
+                <a:latin typeface="Consolas" panose="020B0609020204030204" pitchFamily="49" charset="0"/>
+              </a:rPr>
+              <a:t>	private </a:t>
+            </a:r>
+            <a:r>
+              <a:rPr lang="en-US" sz="1200" dirty="0" err="1">
+                <a:latin typeface="Consolas" panose="020B0609020204030204" pitchFamily="49" charset="0"/>
+              </a:rPr>
+              <a:t>ReordableList</a:t>
+            </a:r>
+            <a:r>
+              <a:rPr lang="en-US" sz="1200" dirty="0">
+                <a:latin typeface="Consolas" panose="020B0609020204030204" pitchFamily="49" charset="0"/>
+              </a:rPr>
+              <a:t> </a:t>
+            </a:r>
+            <a:r>
+              <a:rPr lang="en-US" sz="1200" dirty="0" err="1">
+                <a:latin typeface="Consolas" panose="020B0609020204030204" pitchFamily="49" charset="0"/>
+              </a:rPr>
+              <a:t>propertyList</a:t>
+            </a:r>
+            <a:r>
+              <a:rPr lang="en-US" sz="1200" dirty="0">
+                <a:latin typeface="Consolas" panose="020B0609020204030204" pitchFamily="49" charset="0"/>
+              </a:rPr>
+              <a:t>; // Internal list</a:t>
+            </a:r>
+          </a:p>
+          <a:p>
+            <a:pPr marL="0" indent="0">
+              <a:buNone/>
+            </a:pPr>
+            <a:r>
+              <a:rPr lang="en-US" sz="1200" dirty="0">
+                <a:latin typeface="Consolas" panose="020B0609020204030204" pitchFamily="49" charset="0"/>
+              </a:rPr>
+              <a:t>	</a:t>
+            </a:r>
+          </a:p>
+          <a:p>
+            <a:pPr marL="0" indent="0">
+              <a:buNone/>
+            </a:pPr>
+            <a:r>
+              <a:rPr lang="en-US" sz="1200" dirty="0">
+                <a:latin typeface="Consolas" panose="020B0609020204030204" pitchFamily="49" charset="0"/>
+              </a:rPr>
+              <a:t>	private void </a:t>
+            </a:r>
+            <a:r>
+              <a:rPr lang="en-US" sz="1200" dirty="0" err="1">
+                <a:latin typeface="Consolas" panose="020B0609020204030204" pitchFamily="49" charset="0"/>
+              </a:rPr>
+              <a:t>OnEnable</a:t>
+            </a:r>
+            <a:r>
+              <a:rPr lang="en-US" sz="1200" dirty="0">
+                <a:latin typeface="Consolas" panose="020B0609020204030204" pitchFamily="49" charset="0"/>
+              </a:rPr>
+              <a:t>() {</a:t>
+            </a:r>
+          </a:p>
+          <a:p>
+            <a:pPr marL="0" indent="0">
+              <a:buNone/>
+            </a:pPr>
+            <a:r>
+              <a:rPr lang="en-US" sz="1200" dirty="0">
+                <a:latin typeface="Consolas" panose="020B0609020204030204" pitchFamily="49" charset="0"/>
+              </a:rPr>
+              <a:t>		// Use for initialization</a:t>
+            </a:r>
+          </a:p>
+          <a:p>
+            <a:pPr marL="0" indent="0">
+              <a:buNone/>
+            </a:pPr>
+            <a:r>
+              <a:rPr lang="en-US" sz="1200" dirty="0">
+                <a:latin typeface="Consolas" panose="020B0609020204030204" pitchFamily="49" charset="0"/>
+              </a:rPr>
+              <a:t>	}</a:t>
+            </a:r>
+          </a:p>
+          <a:p>
+            <a:pPr marL="0" indent="0">
+              <a:buNone/>
+            </a:pPr>
+            <a:endParaRPr lang="en-US" sz="1200" dirty="0">
+              <a:latin typeface="Consolas" panose="020B0609020204030204" pitchFamily="49" charset="0"/>
+            </a:endParaRPr>
+          </a:p>
+          <a:p>
+            <a:pPr marL="0" indent="0">
+              <a:buNone/>
+            </a:pPr>
+            <a:r>
+              <a:rPr lang="en-US" sz="1200" dirty="0">
+                <a:latin typeface="Consolas" panose="020B0609020204030204" pitchFamily="49" charset="0"/>
+              </a:rPr>
+              <a:t>	private void </a:t>
+            </a:r>
+            <a:r>
+              <a:rPr lang="en-US" sz="1200" dirty="0" err="1">
+                <a:latin typeface="Consolas" panose="020B0609020204030204" pitchFamily="49" charset="0"/>
+              </a:rPr>
+              <a:t>OnDisable</a:t>
+            </a:r>
+            <a:r>
+              <a:rPr lang="en-US" sz="1200" dirty="0">
+                <a:latin typeface="Consolas" panose="020B0609020204030204" pitchFamily="49" charset="0"/>
+              </a:rPr>
+              <a:t>() {</a:t>
+            </a:r>
+          </a:p>
+          <a:p>
+            <a:pPr marL="0" indent="0">
+              <a:buNone/>
+            </a:pPr>
+            <a:r>
+              <a:rPr lang="en-US" sz="1200" dirty="0">
+                <a:latin typeface="Consolas" panose="020B0609020204030204" pitchFamily="49" charset="0"/>
+              </a:rPr>
+              <a:t>		// Use as destructor</a:t>
+            </a:r>
+          </a:p>
+          <a:p>
+            <a:pPr marL="0" indent="0">
+              <a:buNone/>
+            </a:pPr>
+            <a:r>
+              <a:rPr lang="en-US" sz="1200" dirty="0">
+                <a:latin typeface="Consolas" panose="020B0609020204030204" pitchFamily="49" charset="0"/>
+              </a:rPr>
+              <a:t>	}</a:t>
+            </a:r>
+          </a:p>
+          <a:p>
+            <a:pPr marL="0" indent="0">
+              <a:buNone/>
+            </a:pPr>
+            <a:endParaRPr lang="en-US" sz="1200" dirty="0">
+              <a:latin typeface="Consolas" panose="020B0609020204030204" pitchFamily="49" charset="0"/>
+            </a:endParaRPr>
+          </a:p>
+          <a:p>
+            <a:pPr marL="0" indent="0">
+              <a:buNone/>
+            </a:pPr>
+            <a:r>
+              <a:rPr lang="en-US" sz="1200" dirty="0">
+                <a:latin typeface="Consolas" panose="020B0609020204030204" pitchFamily="49" charset="0"/>
+              </a:rPr>
+              <a:t>	public override void </a:t>
+            </a:r>
+            <a:r>
+              <a:rPr lang="en-US" sz="1200" dirty="0" err="1">
+                <a:latin typeface="Consolas" panose="020B0609020204030204" pitchFamily="49" charset="0"/>
+              </a:rPr>
+              <a:t>OnInspectorGUI</a:t>
+            </a:r>
+            <a:r>
+              <a:rPr lang="en-US" sz="1200" dirty="0">
+                <a:latin typeface="Consolas" panose="020B0609020204030204" pitchFamily="49" charset="0"/>
+              </a:rPr>
+              <a:t>() {</a:t>
+            </a:r>
+          </a:p>
+          <a:p>
+            <a:pPr marL="0" indent="0">
+              <a:buNone/>
+            </a:pPr>
+            <a:r>
+              <a:rPr lang="en-US" sz="1200" dirty="0">
+                <a:latin typeface="Consolas" panose="020B0609020204030204" pitchFamily="49" charset="0"/>
+              </a:rPr>
+              <a:t>		// Where your main code will go</a:t>
+            </a:r>
+          </a:p>
+          <a:p>
+            <a:pPr marL="0" indent="0">
+              <a:buNone/>
+            </a:pPr>
+            <a:r>
+              <a:rPr lang="en-US" sz="1200" dirty="0">
+                <a:latin typeface="Consolas" panose="020B0609020204030204" pitchFamily="49" charset="0"/>
+              </a:rPr>
+              <a:t>	}</a:t>
+            </a:r>
+          </a:p>
+          <a:p>
+            <a:pPr marL="0" indent="0">
+              <a:buNone/>
+            </a:pPr>
+            <a:r>
+              <a:rPr lang="en-US" sz="1200" dirty="0">
+                <a:latin typeface="Consolas" panose="020B0609020204030204" pitchFamily="49" charset="0"/>
+              </a:rPr>
+              <a:t>}</a:t>
+            </a:r>
+          </a:p>
+        </p:txBody>
+      </p:sp>
+    </p:spTree>
+    <p:extLst>
+      <p:ext uri="{BB962C8B-B14F-4D97-AF65-F5344CB8AC3E}">
+        <p14:creationId xmlns:p14="http://schemas.microsoft.com/office/powerpoint/2010/main" val="75091960"/>
+      </p:ext>
+    </p:extLst>
+  </p:cSld>
+  <p:clrMapOvr>
+    <a:masterClrMapping/>
+  </p:clrMapOvr>
+</p:sld>
+</file>
+
+<file path=ppt/slides/slide13.xml><?xml version="1.0" encoding="utf-8"?>
+<p:sld xmlns:a="http://schemas.openxmlformats.org/drawingml/2006/main" xmlns:r="http://schemas.openxmlformats.org/officeDocument/2006/relationships" xmlns:p="http://schemas.openxmlformats.org/presentationml/2006/main">
+  <p:cSld>
+    <p:spTree>
+      <p:nvGrpSpPr>
+        <p:cNvPr id="1" name=""/>
+        <p:cNvGrpSpPr/>
+        <p:nvPr/>
+      </p:nvGrpSpPr>
+      <p:grpSpPr>
+        <a:xfrm>
+          <a:off x="0" y="0"/>
+          <a:ext cx="0" cy="0"/>
+          <a:chOff x="0" y="0"/>
+          <a:chExt cx="0" cy="0"/>
+        </a:xfrm>
+      </p:grpSpPr>
+      <p:sp>
+        <p:nvSpPr>
+          <p:cNvPr id="2" name="Title 1"/>
+          <p:cNvSpPr>
+            <a:spLocks noGrp="1"/>
+          </p:cNvSpPr>
+          <p:nvPr>
+            <p:ph type="title"/>
+          </p:nvPr>
+        </p:nvSpPr>
+        <p:spPr/>
+        <p:txBody>
+          <a:bodyPr/>
+          <a:lstStyle/>
+          <a:p>
+            <a:r>
+              <a:rPr lang="en-US" dirty="0"/>
+              <a:t>Template for </a:t>
+            </a:r>
+            <a:r>
+              <a:rPr lang="en-US" dirty="0" err="1"/>
+              <a:t>SceneView</a:t>
+            </a:r>
+            <a:r>
+              <a:rPr lang="en-US" dirty="0"/>
+              <a:t> Editor Scripting</a:t>
+            </a:r>
+          </a:p>
+        </p:txBody>
+      </p:sp>
+      <p:sp>
+        <p:nvSpPr>
+          <p:cNvPr id="3" name="Content Placeholder 2"/>
+          <p:cNvSpPr>
+            <a:spLocks noGrp="1"/>
+          </p:cNvSpPr>
+          <p:nvPr>
+            <p:ph idx="1"/>
+          </p:nvPr>
+        </p:nvSpPr>
+        <p:spPr>
+          <a:xfrm>
+            <a:off x="818712" y="2072081"/>
+            <a:ext cx="10554574" cy="4664279"/>
+          </a:xfrm>
+        </p:spPr>
+        <p:txBody>
+          <a:bodyPr>
+            <a:normAutofit fontScale="92500" lnSpcReduction="20000"/>
+          </a:bodyPr>
+          <a:lstStyle/>
+          <a:p>
+            <a:pPr marL="0" indent="0">
+              <a:buNone/>
+            </a:pPr>
+            <a:r>
+              <a:rPr lang="en-US" sz="1200" dirty="0">
+                <a:latin typeface="Consolas" panose="020B0609020204030204" pitchFamily="49" charset="0"/>
+              </a:rPr>
+              <a:t>using </a:t>
+            </a:r>
+            <a:r>
+              <a:rPr lang="en-US" sz="1200" dirty="0" err="1">
+                <a:latin typeface="Consolas" panose="020B0609020204030204" pitchFamily="49" charset="0"/>
+              </a:rPr>
+              <a:t>UnityEditor</a:t>
+            </a:r>
+            <a:r>
+              <a:rPr lang="en-US" sz="1200" dirty="0">
+                <a:latin typeface="Consolas" panose="020B0609020204030204" pitchFamily="49" charset="0"/>
+              </a:rPr>
+              <a:t>;</a:t>
+            </a:r>
+          </a:p>
+          <a:p>
+            <a:pPr marL="0" indent="0">
+              <a:buNone/>
+            </a:pPr>
+            <a:r>
+              <a:rPr lang="en-US" sz="1200" dirty="0">
+                <a:latin typeface="Consolas" panose="020B0609020204030204" pitchFamily="49" charset="0"/>
+              </a:rPr>
+              <a:t>using </a:t>
+            </a:r>
+            <a:r>
+              <a:rPr lang="en-US" sz="1200" dirty="0" err="1">
+                <a:latin typeface="Consolas" panose="020B0609020204030204" pitchFamily="49" charset="0"/>
+              </a:rPr>
+              <a:t>UnityEditorInternal</a:t>
+            </a:r>
+            <a:r>
+              <a:rPr lang="en-US" sz="1200" dirty="0">
+                <a:latin typeface="Consolas" panose="020B0609020204030204" pitchFamily="49" charset="0"/>
+              </a:rPr>
+              <a:t>;</a:t>
+            </a:r>
+          </a:p>
+          <a:p>
+            <a:pPr marL="0" indent="0">
+              <a:buNone/>
+            </a:pPr>
+            <a:r>
+              <a:rPr lang="en-US" sz="1200" dirty="0">
+                <a:latin typeface="Consolas" panose="020B0609020204030204" pitchFamily="49" charset="0"/>
+              </a:rPr>
+              <a:t>using </a:t>
+            </a:r>
+            <a:r>
+              <a:rPr lang="en-US" sz="1200" dirty="0" err="1">
+                <a:latin typeface="Consolas" panose="020B0609020204030204" pitchFamily="49" charset="0"/>
+              </a:rPr>
+              <a:t>UnityEngine</a:t>
+            </a:r>
+            <a:r>
+              <a:rPr lang="en-US" sz="1200" dirty="0">
+                <a:latin typeface="Consolas" panose="020B0609020204030204" pitchFamily="49" charset="0"/>
+              </a:rPr>
+              <a:t>;</a:t>
+            </a:r>
+          </a:p>
+          <a:p>
+            <a:pPr marL="0" indent="0">
+              <a:buNone/>
+            </a:pPr>
+            <a:endParaRPr lang="en-US" sz="1200" dirty="0">
+              <a:latin typeface="Consolas" panose="020B0609020204030204" pitchFamily="49" charset="0"/>
+            </a:endParaRPr>
+          </a:p>
+          <a:p>
+            <a:pPr marL="0" indent="0">
+              <a:buNone/>
+            </a:pPr>
+            <a:r>
+              <a:rPr lang="en-US" sz="1200" dirty="0">
+                <a:latin typeface="Consolas" panose="020B0609020204030204" pitchFamily="49" charset="0"/>
+              </a:rPr>
+              <a:t>public class </a:t>
+            </a:r>
+            <a:r>
+              <a:rPr lang="en-US" sz="1200" dirty="0" err="1">
+                <a:latin typeface="Consolas" panose="020B0609020204030204" pitchFamily="49" charset="0"/>
+              </a:rPr>
+              <a:t>EditorSample</a:t>
+            </a:r>
+            <a:r>
+              <a:rPr lang="en-US" sz="1200" dirty="0">
+                <a:latin typeface="Consolas" panose="020B0609020204030204" pitchFamily="49" charset="0"/>
+              </a:rPr>
+              <a:t> : Editor {</a:t>
+            </a:r>
+          </a:p>
+          <a:p>
+            <a:pPr marL="0" indent="0">
+              <a:buNone/>
+            </a:pPr>
+            <a:r>
+              <a:rPr lang="en-US" sz="1200" dirty="0">
+                <a:latin typeface="Consolas" panose="020B0609020204030204" pitchFamily="49" charset="0"/>
+              </a:rPr>
+              <a:t>	// Add your </a:t>
+            </a:r>
+            <a:r>
+              <a:rPr lang="en-US" sz="1200" dirty="0" err="1">
+                <a:latin typeface="Consolas" panose="020B0609020204030204" pitchFamily="49" charset="0"/>
+              </a:rPr>
+              <a:t>serializedProperties</a:t>
+            </a:r>
+            <a:r>
+              <a:rPr lang="en-US" sz="1200" dirty="0">
+                <a:latin typeface="Consolas" panose="020B0609020204030204" pitchFamily="49" charset="0"/>
+              </a:rPr>
+              <a:t> here</a:t>
+            </a:r>
+          </a:p>
+          <a:p>
+            <a:pPr marL="0" indent="0">
+              <a:buNone/>
+            </a:pPr>
+            <a:r>
+              <a:rPr lang="en-US" sz="1200" dirty="0">
+                <a:latin typeface="Consolas" panose="020B0609020204030204" pitchFamily="49" charset="0"/>
+              </a:rPr>
+              <a:t>	private void </a:t>
+            </a:r>
+            <a:r>
+              <a:rPr lang="en-US" sz="1200" dirty="0" err="1">
+                <a:latin typeface="Consolas" panose="020B0609020204030204" pitchFamily="49" charset="0"/>
+              </a:rPr>
+              <a:t>OnEnable</a:t>
+            </a:r>
+            <a:r>
+              <a:rPr lang="en-US" sz="1200" dirty="0">
+                <a:latin typeface="Consolas" panose="020B0609020204030204" pitchFamily="49" charset="0"/>
+              </a:rPr>
+              <a:t>() {</a:t>
+            </a:r>
+          </a:p>
+          <a:p>
+            <a:pPr marL="0" indent="0">
+              <a:buNone/>
+            </a:pPr>
+            <a:r>
+              <a:rPr lang="en-US" sz="1200" dirty="0">
+                <a:latin typeface="Consolas" panose="020B0609020204030204" pitchFamily="49" charset="0"/>
+              </a:rPr>
+              <a:t>		// Use for initialization</a:t>
+            </a:r>
+          </a:p>
+          <a:p>
+            <a:pPr marL="0" indent="0">
+              <a:buNone/>
+            </a:pPr>
+            <a:r>
+              <a:rPr lang="en-US" sz="1200" dirty="0">
+                <a:latin typeface="Consolas" panose="020B0609020204030204" pitchFamily="49" charset="0"/>
+              </a:rPr>
+              <a:t>	}</a:t>
+            </a:r>
+          </a:p>
+          <a:p>
+            <a:pPr marL="0" indent="0">
+              <a:buNone/>
+            </a:pPr>
+            <a:endParaRPr lang="en-US" sz="1200" dirty="0">
+              <a:latin typeface="Consolas" panose="020B0609020204030204" pitchFamily="49" charset="0"/>
+            </a:endParaRPr>
+          </a:p>
+          <a:p>
+            <a:pPr marL="0" indent="0">
+              <a:buNone/>
+            </a:pPr>
+            <a:r>
+              <a:rPr lang="en-US" sz="1200" dirty="0">
+                <a:latin typeface="Consolas" panose="020B0609020204030204" pitchFamily="49" charset="0"/>
+              </a:rPr>
+              <a:t>	private void </a:t>
+            </a:r>
+            <a:r>
+              <a:rPr lang="en-US" sz="1200" dirty="0" err="1">
+                <a:latin typeface="Consolas" panose="020B0609020204030204" pitchFamily="49" charset="0"/>
+              </a:rPr>
+              <a:t>OnDisable</a:t>
+            </a:r>
+            <a:r>
+              <a:rPr lang="en-US" sz="1200" dirty="0">
+                <a:latin typeface="Consolas" panose="020B0609020204030204" pitchFamily="49" charset="0"/>
+              </a:rPr>
+              <a:t>() {</a:t>
+            </a:r>
+          </a:p>
+          <a:p>
+            <a:pPr marL="0" indent="0">
+              <a:buNone/>
+            </a:pPr>
+            <a:r>
+              <a:rPr lang="en-US" sz="1200" dirty="0">
+                <a:latin typeface="Consolas" panose="020B0609020204030204" pitchFamily="49" charset="0"/>
+              </a:rPr>
+              <a:t>		// Use as destructor</a:t>
+            </a:r>
+          </a:p>
+          <a:p>
+            <a:pPr marL="0" indent="0">
+              <a:buNone/>
+            </a:pPr>
+            <a:r>
+              <a:rPr lang="en-US" sz="1200" dirty="0">
+                <a:latin typeface="Consolas" panose="020B0609020204030204" pitchFamily="49" charset="0"/>
+              </a:rPr>
+              <a:t>	}</a:t>
+            </a:r>
+          </a:p>
+          <a:p>
+            <a:pPr marL="0" indent="0">
+              <a:buNone/>
+            </a:pPr>
+            <a:endParaRPr lang="en-US" sz="1200" dirty="0">
+              <a:latin typeface="Consolas" panose="020B0609020204030204" pitchFamily="49" charset="0"/>
+            </a:endParaRPr>
+          </a:p>
+          <a:p>
+            <a:pPr marL="0" indent="0">
+              <a:buNone/>
+            </a:pPr>
+            <a:r>
+              <a:rPr lang="en-US" sz="1200" dirty="0">
+                <a:latin typeface="Consolas" panose="020B0609020204030204" pitchFamily="49" charset="0"/>
+              </a:rPr>
+              <a:t>	public override void </a:t>
+            </a:r>
+            <a:r>
+              <a:rPr lang="en-US" sz="1200" dirty="0" err="1">
+                <a:latin typeface="Consolas" panose="020B0609020204030204" pitchFamily="49" charset="0"/>
+              </a:rPr>
+              <a:t>OnSceneGUI</a:t>
+            </a:r>
+            <a:r>
+              <a:rPr lang="en-US" sz="1200" dirty="0">
+                <a:latin typeface="Consolas" panose="020B0609020204030204" pitchFamily="49" charset="0"/>
+              </a:rPr>
+              <a:t>(</a:t>
+            </a:r>
+            <a:r>
+              <a:rPr lang="en-US" sz="1200" dirty="0" err="1">
+                <a:latin typeface="Consolas" panose="020B0609020204030204" pitchFamily="49" charset="0"/>
+              </a:rPr>
+              <a:t>SceneView</a:t>
+            </a:r>
+            <a:r>
+              <a:rPr lang="en-US" sz="1200" dirty="0">
+                <a:latin typeface="Consolas" panose="020B0609020204030204" pitchFamily="49" charset="0"/>
+              </a:rPr>
+              <a:t> </a:t>
+            </a:r>
+            <a:r>
+              <a:rPr lang="en-US" sz="1200" dirty="0" err="1">
+                <a:latin typeface="Consolas" panose="020B0609020204030204" pitchFamily="49" charset="0"/>
+              </a:rPr>
+              <a:t>sceneView</a:t>
+            </a:r>
+            <a:r>
+              <a:rPr lang="en-US" sz="1200" dirty="0">
+                <a:latin typeface="Consolas" panose="020B0609020204030204" pitchFamily="49" charset="0"/>
+              </a:rPr>
+              <a:t>) {</a:t>
+            </a:r>
+          </a:p>
+          <a:p>
+            <a:pPr marL="0" indent="0">
+              <a:buNone/>
+            </a:pPr>
+            <a:r>
+              <a:rPr lang="en-US" sz="1200" dirty="0">
+                <a:latin typeface="Consolas" panose="020B0609020204030204" pitchFamily="49" charset="0"/>
+              </a:rPr>
+              <a:t>		// Where your main code will go</a:t>
+            </a:r>
+          </a:p>
+          <a:p>
+            <a:pPr marL="0" indent="0">
+              <a:buNone/>
+            </a:pPr>
+            <a:r>
+              <a:rPr lang="en-US" sz="1200" dirty="0">
+                <a:latin typeface="Consolas" panose="020B0609020204030204" pitchFamily="49" charset="0"/>
+              </a:rPr>
+              <a:t>	}</a:t>
+            </a:r>
+          </a:p>
+          <a:p>
+            <a:pPr marL="0" indent="0">
+              <a:buNone/>
+            </a:pPr>
+            <a:r>
+              <a:rPr lang="en-US" sz="1200" dirty="0">
+                <a:latin typeface="Consolas" panose="020B0609020204030204" pitchFamily="49" charset="0"/>
+              </a:rPr>
+              <a:t>}</a:t>
+            </a:r>
+          </a:p>
+        </p:txBody>
+      </p:sp>
+    </p:spTree>
+    <p:extLst>
+      <p:ext uri="{BB962C8B-B14F-4D97-AF65-F5344CB8AC3E}">
+        <p14:creationId xmlns:p14="http://schemas.microsoft.com/office/powerpoint/2010/main" val="3058183336"/>
+      </p:ext>
+    </p:extLst>
+  </p:cSld>
+  <p:clrMapOvr>
+    <a:masterClrMapping/>
+  </p:clrMapOvr>
+</p:sld>
+</file>
+
+<file path=ppt/slides/slide14.xml><?xml version="1.0" encoding="utf-8"?>
+<p:sld xmlns:a="http://schemas.openxmlformats.org/drawingml/2006/main" xmlns:r="http://schemas.openxmlformats.org/officeDocument/2006/relationships" xmlns:p="http://schemas.openxmlformats.org/presentationml/2006/main">
+  <p:cSld>
+    <p:spTree>
+      <p:nvGrpSpPr>
+        <p:cNvPr id="1" name=""/>
+        <p:cNvGrpSpPr/>
+        <p:nvPr/>
+      </p:nvGrpSpPr>
+      <p:grpSpPr>
+        <a:xfrm>
+          <a:off x="0" y="0"/>
+          <a:ext cx="0" cy="0"/>
+          <a:chOff x="0" y="0"/>
+          <a:chExt cx="0" cy="0"/>
+        </a:xfrm>
+      </p:grpSpPr>
+      <p:sp>
+        <p:nvSpPr>
+          <p:cNvPr id="2" name="Title 1"/>
+          <p:cNvSpPr>
+            <a:spLocks noGrp="1"/>
+          </p:cNvSpPr>
+          <p:nvPr>
+            <p:ph type="title"/>
+          </p:nvPr>
+        </p:nvSpPr>
+        <p:spPr/>
+        <p:txBody>
+          <a:bodyPr/>
+          <a:lstStyle/>
+          <a:p>
+            <a:r>
+              <a:rPr lang="en-US" dirty="0"/>
+              <a:t>Delegates</a:t>
+            </a:r>
+          </a:p>
+        </p:txBody>
+      </p:sp>
+      <p:sp>
+        <p:nvSpPr>
+          <p:cNvPr id="3" name="Content Placeholder 2"/>
+          <p:cNvSpPr>
+            <a:spLocks noGrp="1"/>
+          </p:cNvSpPr>
+          <p:nvPr>
+            <p:ph idx="1"/>
+          </p:nvPr>
+        </p:nvSpPr>
+        <p:spPr/>
+        <p:txBody>
+          <a:bodyPr/>
+          <a:lstStyle/>
+          <a:p>
+            <a:r>
+              <a:rPr lang="en-US" dirty="0"/>
+              <a:t>These are functions – which may contain functionality of many different functions</a:t>
+            </a:r>
+          </a:p>
+          <a:p>
+            <a:r>
+              <a:rPr lang="en-US" dirty="0"/>
+              <a:t>If you’re used to C++ then they are similar to function pointers</a:t>
+            </a:r>
+          </a:p>
+          <a:p>
+            <a:pPr lvl="1"/>
+            <a:r>
+              <a:rPr lang="en-US" dirty="0">
+                <a:latin typeface="Consolas" panose="020B0609020204030204" pitchFamily="49" charset="0"/>
+              </a:rPr>
+              <a:t>void *</a:t>
+            </a:r>
+            <a:r>
+              <a:rPr lang="en-US" dirty="0" err="1">
+                <a:latin typeface="Consolas" panose="020B0609020204030204" pitchFamily="49" charset="0"/>
+              </a:rPr>
+              <a:t>some_cpp_function</a:t>
+            </a:r>
+            <a:r>
+              <a:rPr lang="en-US" dirty="0">
+                <a:latin typeface="Consolas" panose="020B0609020204030204" pitchFamily="49" charset="0"/>
+              </a:rPr>
+              <a:t>();</a:t>
+            </a:r>
+          </a:p>
+          <a:p>
+            <a:r>
+              <a:rPr lang="en-US" dirty="0">
+                <a:latin typeface="+mj-lt"/>
+              </a:rPr>
+              <a:t>Otherwise, imagine a container with the same type of functions and parameters:</a:t>
+            </a:r>
+          </a:p>
+          <a:p>
+            <a:pPr lvl="1"/>
+            <a:r>
+              <a:rPr lang="en-US" dirty="0">
+                <a:latin typeface="Consolas" panose="020B0609020204030204" pitchFamily="49" charset="0"/>
+              </a:rPr>
+              <a:t>[ void function_1(</a:t>
+            </a:r>
+            <a:r>
+              <a:rPr lang="en-US" dirty="0" err="1">
+                <a:latin typeface="Consolas" panose="020B0609020204030204" pitchFamily="49" charset="0"/>
+              </a:rPr>
+              <a:t>int</a:t>
+            </a:r>
+            <a:r>
+              <a:rPr lang="en-US" dirty="0">
+                <a:latin typeface="Consolas" panose="020B0609020204030204" pitchFamily="49" charset="0"/>
+              </a:rPr>
+              <a:t>), void function_2(</a:t>
+            </a:r>
+            <a:r>
+              <a:rPr lang="en-US" dirty="0" err="1">
+                <a:latin typeface="Consolas" panose="020B0609020204030204" pitchFamily="49" charset="0"/>
+              </a:rPr>
+              <a:t>int</a:t>
+            </a:r>
+            <a:r>
+              <a:rPr lang="en-US" dirty="0">
+                <a:latin typeface="Consolas" panose="020B0609020204030204" pitchFamily="49" charset="0"/>
+              </a:rPr>
+              <a:t>), void function_3(</a:t>
+            </a:r>
+            <a:r>
+              <a:rPr lang="en-US" dirty="0" err="1">
+                <a:latin typeface="Consolas" panose="020B0609020204030204" pitchFamily="49" charset="0"/>
+              </a:rPr>
+              <a:t>int</a:t>
+            </a:r>
+            <a:r>
+              <a:rPr lang="en-US" dirty="0">
+                <a:latin typeface="Consolas" panose="020B0609020204030204" pitchFamily="49" charset="0"/>
+              </a:rPr>
+              <a:t>) ]</a:t>
+            </a:r>
+          </a:p>
+          <a:p>
+            <a:pPr lvl="1"/>
+            <a:r>
+              <a:rPr lang="en-US" dirty="0">
+                <a:latin typeface="+mj-lt"/>
+              </a:rPr>
+              <a:t>We can invoke all of them without directly calling them!</a:t>
+            </a:r>
+          </a:p>
+          <a:p>
+            <a:pPr lvl="1"/>
+            <a:r>
+              <a:rPr lang="en-US" dirty="0">
+                <a:latin typeface="+mj-lt"/>
+              </a:rPr>
+              <a:t>Useful for event based programming – which is essential editor scripting</a:t>
+            </a:r>
+          </a:p>
+          <a:p>
+            <a:r>
+              <a:rPr lang="en-US" dirty="0">
+                <a:latin typeface="+mj-lt"/>
+              </a:rPr>
+              <a:t>A function can be added to a delegate using the += operator</a:t>
+            </a:r>
+          </a:p>
+          <a:p>
+            <a:r>
+              <a:rPr lang="en-US" dirty="0">
+                <a:latin typeface="+mj-lt"/>
+              </a:rPr>
+              <a:t>A function can be removed from a delegate using the -= operator</a:t>
+            </a:r>
+          </a:p>
+        </p:txBody>
+      </p:sp>
+    </p:spTree>
+    <p:extLst>
+      <p:ext uri="{BB962C8B-B14F-4D97-AF65-F5344CB8AC3E}">
+        <p14:creationId xmlns:p14="http://schemas.microsoft.com/office/powerpoint/2010/main" val="3693195828"/>
+      </p:ext>
+    </p:extLst>
+  </p:cSld>
+  <p:clrMapOvr>
+    <a:masterClrMapping/>
+  </p:clrMapOvr>
+</p:sld>
+</file>
+
+<file path=ppt/slides/slide15.xml><?xml version="1.0" encoding="utf-8"?>
+<p:sld xmlns:a="http://schemas.openxmlformats.org/drawingml/2006/main" xmlns:r="http://schemas.openxmlformats.org/officeDocument/2006/relationships" xmlns:p="http://schemas.openxmlformats.org/presentationml/2006/main">
+  <p:cSld>
+    <p:spTree>
+      <p:nvGrpSpPr>
+        <p:cNvPr id="1" name=""/>
+        <p:cNvGrpSpPr/>
+        <p:nvPr/>
+      </p:nvGrpSpPr>
+      <p:grpSpPr>
+        <a:xfrm>
+          <a:off x="0" y="0"/>
+          <a:ext cx="0" cy="0"/>
+          <a:chOff x="0" y="0"/>
+          <a:chExt cx="0" cy="0"/>
+        </a:xfrm>
+      </p:grpSpPr>
+      <p:sp>
+        <p:nvSpPr>
+          <p:cNvPr id="2" name="Title 1"/>
+          <p:cNvSpPr>
+            <a:spLocks noGrp="1"/>
+          </p:cNvSpPr>
+          <p:nvPr>
+            <p:ph type="title"/>
+          </p:nvPr>
+        </p:nvSpPr>
+        <p:spPr/>
+        <p:txBody>
+          <a:bodyPr/>
+          <a:lstStyle/>
+          <a:p>
+            <a:r>
+              <a:rPr lang="en-US" dirty="0"/>
+              <a:t>Lambdas</a:t>
+            </a:r>
+          </a:p>
+        </p:txBody>
+      </p:sp>
+      <p:sp>
+        <p:nvSpPr>
+          <p:cNvPr id="3" name="Content Placeholder 2"/>
+          <p:cNvSpPr>
+            <a:spLocks noGrp="1"/>
+          </p:cNvSpPr>
+          <p:nvPr>
+            <p:ph idx="1"/>
+          </p:nvPr>
+        </p:nvSpPr>
+        <p:spPr/>
+        <p:txBody>
+          <a:bodyPr/>
+          <a:lstStyle/>
+          <a:p>
+            <a:r>
+              <a:rPr lang="en-US" dirty="0"/>
+              <a:t>Lambdas are anonymous functions – functions without an explicit function definition</a:t>
+            </a:r>
+          </a:p>
+          <a:p>
+            <a:r>
+              <a:rPr lang="en-US" dirty="0"/>
+              <a:t>Example:</a:t>
+            </a:r>
+          </a:p>
+          <a:p>
+            <a:pPr lvl="1"/>
+            <a:r>
+              <a:rPr lang="en-US" dirty="0">
+                <a:latin typeface="Consolas" panose="020B0609020204030204" pitchFamily="49" charset="0"/>
+              </a:rPr>
+              <a:t>EXPLICIT: </a:t>
+            </a:r>
+            <a:r>
+              <a:rPr lang="en-US" dirty="0" err="1">
+                <a:latin typeface="Consolas" panose="020B0609020204030204" pitchFamily="49" charset="0"/>
+              </a:rPr>
+              <a:t>int</a:t>
+            </a:r>
+            <a:r>
+              <a:rPr lang="en-US" dirty="0">
+                <a:latin typeface="Consolas" panose="020B0609020204030204" pitchFamily="49" charset="0"/>
+              </a:rPr>
+              <a:t> add(</a:t>
+            </a:r>
+            <a:r>
+              <a:rPr lang="en-US" dirty="0" err="1">
+                <a:latin typeface="Consolas" panose="020B0609020204030204" pitchFamily="49" charset="0"/>
+              </a:rPr>
+              <a:t>int</a:t>
+            </a:r>
+            <a:r>
+              <a:rPr lang="en-US" dirty="0">
+                <a:latin typeface="Consolas" panose="020B0609020204030204" pitchFamily="49" charset="0"/>
+              </a:rPr>
+              <a:t> a, </a:t>
+            </a:r>
+            <a:r>
+              <a:rPr lang="en-US" dirty="0" err="1">
+                <a:latin typeface="Consolas" panose="020B0609020204030204" pitchFamily="49" charset="0"/>
+              </a:rPr>
+              <a:t>int</a:t>
+            </a:r>
+            <a:r>
+              <a:rPr lang="en-US" dirty="0">
+                <a:latin typeface="Consolas" panose="020B0609020204030204" pitchFamily="49" charset="0"/>
+              </a:rPr>
+              <a:t> b) { return a + b; }</a:t>
+            </a:r>
+          </a:p>
+          <a:p>
+            <a:pPr lvl="1"/>
+            <a:r>
+              <a:rPr lang="en-US" dirty="0">
+                <a:latin typeface="Consolas" panose="020B0609020204030204" pitchFamily="49" charset="0"/>
+              </a:rPr>
+              <a:t>IMPLICIT: (</a:t>
+            </a:r>
+            <a:r>
+              <a:rPr lang="en-US" dirty="0" err="1">
+                <a:latin typeface="Consolas" panose="020B0609020204030204" pitchFamily="49" charset="0"/>
+              </a:rPr>
+              <a:t>int</a:t>
+            </a:r>
+            <a:r>
+              <a:rPr lang="en-US" dirty="0">
+                <a:latin typeface="Consolas" panose="020B0609020204030204" pitchFamily="49" charset="0"/>
+              </a:rPr>
+              <a:t> a, </a:t>
+            </a:r>
+            <a:r>
+              <a:rPr lang="en-US" dirty="0" err="1">
+                <a:latin typeface="Consolas" panose="020B0609020204030204" pitchFamily="49" charset="0"/>
+              </a:rPr>
+              <a:t>int</a:t>
+            </a:r>
+            <a:r>
+              <a:rPr lang="en-US" dirty="0">
+                <a:latin typeface="Consolas" panose="020B0609020204030204" pitchFamily="49" charset="0"/>
+              </a:rPr>
+              <a:t> b) =&gt; { return a + b };</a:t>
+            </a:r>
+          </a:p>
+          <a:p>
+            <a:pPr lvl="1"/>
+            <a:r>
+              <a:rPr lang="en-US" dirty="0">
+                <a:latin typeface="Consolas" panose="020B0609020204030204" pitchFamily="49" charset="0"/>
+              </a:rPr>
+              <a:t>The two statements are equivalently the same</a:t>
+            </a:r>
+          </a:p>
+          <a:p>
+            <a:r>
+              <a:rPr lang="en-US" dirty="0">
+                <a:latin typeface="+mj-lt"/>
+              </a:rPr>
+              <a:t>Lambdas are short hands for writing functionalities into delegates, but fundamentally they are functions</a:t>
+            </a:r>
+          </a:p>
+          <a:p>
+            <a:pPr lvl="1"/>
+            <a:endParaRPr lang="en-US" dirty="0">
+              <a:latin typeface="Consolas" panose="020B0609020204030204" pitchFamily="49" charset="0"/>
+            </a:endParaRPr>
+          </a:p>
+        </p:txBody>
+      </p:sp>
+    </p:spTree>
+    <p:extLst>
+      <p:ext uri="{BB962C8B-B14F-4D97-AF65-F5344CB8AC3E}">
+        <p14:creationId xmlns:p14="http://schemas.microsoft.com/office/powerpoint/2010/main" val="1942837319"/>
+      </p:ext>
+    </p:extLst>
+  </p:cSld>
+  <p:clrMapOvr>
+    <a:masterClrMapping/>
+  </p:clrMapOvr>
+</p:sld>
+</file>
+
+<file path=ppt/slides/slide16.xml><?xml version="1.0" encoding="utf-8"?>
+<p:sld xmlns:a="http://schemas.openxmlformats.org/drawingml/2006/main" xmlns:r="http://schemas.openxmlformats.org/officeDocument/2006/relationships" xmlns:p="http://schemas.openxmlformats.org/presentationml/2006/main">
+  <p:cSld>
+    <p:spTree>
+      <p:nvGrpSpPr>
+        <p:cNvPr id="1" name=""/>
+        <p:cNvGrpSpPr/>
+        <p:nvPr/>
+      </p:nvGrpSpPr>
+      <p:grpSpPr>
+        <a:xfrm>
+          <a:off x="0" y="0"/>
+          <a:ext cx="0" cy="0"/>
+          <a:chOff x="0" y="0"/>
+          <a:chExt cx="0" cy="0"/>
+        </a:xfrm>
+      </p:grpSpPr>
+      <p:sp>
+        <p:nvSpPr>
+          <p:cNvPr id="2" name="Title 1"/>
+          <p:cNvSpPr>
+            <a:spLocks noGrp="1"/>
+          </p:cNvSpPr>
+          <p:nvPr>
+            <p:ph type="title"/>
+          </p:nvPr>
+        </p:nvSpPr>
+        <p:spPr/>
+        <p:txBody>
+          <a:bodyPr/>
+          <a:lstStyle/>
+          <a:p>
+            <a:r>
+              <a:rPr lang="en-US" dirty="0"/>
               <a:t>Recap</a:t>
             </a:r>
           </a:p>
@@ -5805,7 +6926,7 @@
           <a:p>
             <a:r>
               <a:rPr lang="en-US" dirty="0"/>
-              <a:t>Editor scripting is about finding the properties we need to manipulate and show.</a:t>
+              <a:t>Editor scripting is about finding the properties we need to manipulate and show</a:t>
             </a:r>
           </a:p>
           <a:p>
@@ -5825,7 +6946,7 @@
           <a:p>
             <a:r>
               <a:rPr lang="en-US" dirty="0"/>
-              <a:t>Editor Scripting requires some hard coding, you can make it generic – but it requires some degree of engineering to make it entirely flexible.</a:t>
+              <a:t>Editor Scripting requires some hard coding, you can make it generic – but it requires some degree of engineering to make it entirely flexible</a:t>
             </a:r>
           </a:p>
         </p:txBody>
@@ -5843,7 +6964,7 @@
 </p:sld>
 </file>
 
-<file path=ppt/slides/slide13.xml><?xml version="1.0" encoding="utf-8"?>
+<file path=ppt/slides/slide17.xml><?xml version="1.0" encoding="utf-8"?>
 <p:sld xmlns:a="http://schemas.openxmlformats.org/drawingml/2006/main" xmlns:r="http://schemas.openxmlformats.org/officeDocument/2006/relationships" xmlns:p="http://schemas.openxmlformats.org/presentationml/2006/main">
   <p:cSld>
     <p:spTree>
@@ -6089,6 +7210,13 @@
             <a:r>
               <a:rPr lang="en-US" dirty="0"/>
               <a:t>Decorators overlap base functionality and provides modularity and extensions</a:t>
+            </a:r>
+          </a:p>
+          <a:p>
+            <a:pPr lvl="1"/>
+            <a:r>
+              <a:rPr lang="en-US" dirty="0"/>
+              <a:t>Hence they “decorate” functionality and make things easier</a:t>
             </a:r>
           </a:p>
           <a:p>
@@ -6557,7 +7685,7 @@
           <a:p>
             <a:r>
               <a:rPr lang="en-US" dirty="0"/>
-              <a:t>Is there an API for it?</a:t>
+              <a:t>When Editor Scripting is Useful</a:t>
             </a:r>
           </a:p>
         </p:txBody>
@@ -6579,37 +7707,140 @@
           <a:p>
             <a:r>
               <a:rPr lang="en-US" dirty="0"/>
-              <a:t>Short answer, YES</a:t>
-            </a:r>
-          </a:p>
-          <a:p>
-            <a:r>
-              <a:rPr lang="en-US" dirty="0"/>
-              <a:t>Long answer: Unity provides no documentation to some of the stuff we’re doing. A few things we will do have documentation.</a:t>
-            </a:r>
-          </a:p>
-          <a:p>
-            <a:r>
-              <a:rPr lang="en-US" dirty="0"/>
-              <a:t>See the </a:t>
-            </a:r>
-            <a:r>
-              <a:rPr lang="en-US" dirty="0">
-                <a:hlinkClick r:id="rId2"/>
-              </a:rPr>
-              <a:t>Editor</a:t>
-            </a:r>
-            <a:r>
-              <a:rPr lang="en-US" dirty="0"/>
-              <a:t> class in Unity’s API</a:t>
-            </a:r>
+              <a:t>Imagine an array of structs/classes</a:t>
+            </a:r>
+          </a:p>
+          <a:p>
+            <a:pPr lvl="1"/>
+            <a:r>
+              <a:rPr lang="en-US" dirty="0"/>
+              <a:t>Structs/classes can have multiple fields inside them</a:t>
+            </a:r>
+          </a:p>
+          <a:p>
+            <a:pPr lvl="1"/>
+            <a:r>
+              <a:rPr lang="en-US" dirty="0"/>
+              <a:t>An array of those can be nightmarish to implement</a:t>
+            </a:r>
+          </a:p>
+          <a:p>
+            <a:pPr lvl="1"/>
+            <a:r>
+              <a:rPr lang="en-US" dirty="0"/>
+              <a:t>Seriously who wants to keep clicking and manipulating the drop down and the string like below!?</a:t>
+            </a:r>
+          </a:p>
+          <a:p>
+            <a:pPr lvl="1"/>
+            <a:endParaRPr lang="en-US" dirty="0"/>
+          </a:p>
+          <a:p>
+            <a:pPr lvl="1"/>
+            <a:endParaRPr lang="en-US" dirty="0"/>
+          </a:p>
+          <a:p>
+            <a:pPr lvl="1"/>
+            <a:endParaRPr lang="en-US" dirty="0"/>
+          </a:p>
+          <a:p>
+            <a:pPr lvl="1"/>
+            <a:endParaRPr lang="en-US" dirty="0"/>
+          </a:p>
+        </p:txBody>
+      </p:sp>
+      <p:pic>
+        <p:nvPicPr>
+          <p:cNvPr id="4" name="Picture 3"/>
+          <p:cNvPicPr>
+            <a:picLocks noChangeAspect="1"/>
+          </p:cNvPicPr>
+          <p:nvPr/>
+        </p:nvPicPr>
+        <p:blipFill>
+          <a:blip r:embed="rId2"/>
+          <a:stretch>
+            <a:fillRect/>
+          </a:stretch>
+        </p:blipFill>
+        <p:spPr>
+          <a:xfrm>
+            <a:off x="1194557" y="4119519"/>
+            <a:ext cx="3695700" cy="2628900"/>
+          </a:xfrm>
+          <a:prstGeom prst="rect">
+            <a:avLst/>
+          </a:prstGeom>
+        </p:spPr>
+      </p:pic>
+      <p:pic>
+        <p:nvPicPr>
+          <p:cNvPr id="5" name="Picture 4"/>
+          <p:cNvPicPr>
+            <a:picLocks noChangeAspect="1"/>
+          </p:cNvPicPr>
+          <p:nvPr/>
+        </p:nvPicPr>
+        <p:blipFill>
+          <a:blip r:embed="rId3"/>
+          <a:stretch>
+            <a:fillRect/>
+          </a:stretch>
+        </p:blipFill>
+        <p:spPr>
+          <a:xfrm>
+            <a:off x="7063224" y="4814844"/>
+            <a:ext cx="3686175" cy="1238250"/>
+          </a:xfrm>
+          <a:prstGeom prst="rect">
+            <a:avLst/>
+          </a:prstGeom>
+        </p:spPr>
+      </p:pic>
+      <p:sp>
+        <p:nvSpPr>
+          <p:cNvPr id="6" name="Arrow: Right 5"/>
+          <p:cNvSpPr/>
+          <p:nvPr/>
+        </p:nvSpPr>
+        <p:spPr>
+          <a:xfrm>
+            <a:off x="5167618" y="5234730"/>
+            <a:ext cx="1694576" cy="449754"/>
+          </a:xfrm>
+          <a:prstGeom prst="rightArrow">
+            <a:avLst/>
+          </a:prstGeom>
+        </p:spPr>
+        <p:style>
+          <a:lnRef idx="2">
+            <a:schemeClr val="accent1">
+              <a:shade val="50000"/>
+            </a:schemeClr>
+          </a:lnRef>
+          <a:fillRef idx="1">
+            <a:schemeClr val="accent1"/>
+          </a:fillRef>
+          <a:effectRef idx="0">
+            <a:schemeClr val="accent1"/>
+          </a:effectRef>
+          <a:fontRef idx="minor">
+            <a:schemeClr val="lt1"/>
+          </a:fontRef>
+        </p:style>
+        <p:txBody>
+          <a:bodyPr rtlCol="0" anchor="ctr"/>
+          <a:lstStyle/>
+          <a:p>
+            <a:pPr algn="ctr"/>
+            <a:endParaRPr lang="en-US"/>
           </a:p>
         </p:txBody>
       </p:sp>
     </p:spTree>
     <p:extLst>
       <p:ext uri="{BB962C8B-B14F-4D97-AF65-F5344CB8AC3E}">
-        <p14:creationId xmlns:p14="http://schemas.microsoft.com/office/powerpoint/2010/main" val="3611206107"/>
+        <p14:creationId xmlns:p14="http://schemas.microsoft.com/office/powerpoint/2010/main" val="3755753641"/>
       </p:ext>
     </p:extLst>
   </p:cSld>
@@ -6653,7 +7884,7 @@
           <a:p>
             <a:r>
               <a:rPr lang="en-US" dirty="0"/>
-              <a:t>Editor Scripting</a:t>
+              <a:t>Is there an API for it?</a:t>
             </a:r>
           </a:p>
         </p:txBody>
@@ -6675,81 +7906,29 @@
           <a:p>
             <a:r>
               <a:rPr lang="en-US" dirty="0"/>
-              <a:t>Your class must derive from the </a:t>
-            </a:r>
-            <a:r>
-              <a:rPr lang="en-US" b="1" dirty="0"/>
+              <a:t>Short answer, YES</a:t>
+            </a:r>
+          </a:p>
+          <a:p>
+            <a:r>
+              <a:rPr lang="en-US" dirty="0"/>
+              <a:t>Long answer: Unity provides no documentation for some of the stuff we’re doing. A few things we will do have documentation</a:t>
+            </a:r>
+          </a:p>
+          <a:p>
+            <a:r>
+              <a:rPr lang="en-US" dirty="0"/>
+              <a:t>See the </a:t>
+            </a:r>
+            <a:r>
+              <a:rPr lang="en-US" dirty="0">
+                <a:hlinkClick r:id="rId2"/>
+              </a:rPr>
               <a:t>Editor</a:t>
             </a:r>
             <a:r>
               <a:rPr lang="en-US" dirty="0"/>
-              <a:t> class, not </a:t>
-            </a:r>
-            <a:r>
-              <a:rPr lang="en-US" b="1" dirty="0" err="1"/>
-              <a:t>MonoBehaviour</a:t>
-            </a:r>
-            <a:r>
-              <a:rPr lang="en-US" dirty="0"/>
-              <a:t>.</a:t>
-            </a:r>
-          </a:p>
-          <a:p>
-            <a:r>
-              <a:rPr lang="en-US" dirty="0"/>
-              <a:t>Use </a:t>
-            </a:r>
-            <a:r>
-              <a:rPr lang="en-US" b="1" dirty="0" err="1"/>
-              <a:t>OnEnable</a:t>
-            </a:r>
-            <a:r>
-              <a:rPr lang="en-US" b="1" dirty="0"/>
-              <a:t>()</a:t>
-            </a:r>
-            <a:r>
-              <a:rPr lang="en-US" dirty="0"/>
-              <a:t> and </a:t>
-            </a:r>
-            <a:r>
-              <a:rPr lang="en-US" b="1" dirty="0" err="1"/>
-              <a:t>OnDisable</a:t>
-            </a:r>
-            <a:r>
-              <a:rPr lang="en-US" b="1" dirty="0"/>
-              <a:t>()</a:t>
-            </a:r>
-            <a:r>
-              <a:rPr lang="en-US" dirty="0"/>
-              <a:t> as your constructor and destructor</a:t>
-            </a:r>
-          </a:p>
-          <a:p>
-            <a:r>
-              <a:rPr lang="en-US" dirty="0"/>
-              <a:t>Always use </a:t>
-            </a:r>
-            <a:r>
-              <a:rPr lang="en-US" b="1" dirty="0" err="1"/>
-              <a:t>UnityEditor</a:t>
-            </a:r>
-            <a:r>
-              <a:rPr lang="en-US" b="1" dirty="0"/>
-              <a:t> </a:t>
-            </a:r>
-            <a:r>
-              <a:rPr lang="en-US" dirty="0"/>
-              <a:t>namespace!</a:t>
-            </a:r>
-          </a:p>
-          <a:p>
-            <a:r>
-              <a:rPr lang="en-US" b="1" dirty="0" err="1"/>
-              <a:t>UnityEditorInternal</a:t>
-            </a:r>
-            <a:r>
-              <a:rPr lang="en-US" dirty="0"/>
-              <a:t> namespace is optional</a:t>
+              <a:t> class in Unity’s API</a:t>
             </a:r>
           </a:p>
         </p:txBody>
@@ -6757,7 +7936,7 @@
     </p:spTree>
     <p:extLst>
       <p:ext uri="{BB962C8B-B14F-4D97-AF65-F5344CB8AC3E}">
-        <p14:creationId xmlns:p14="http://schemas.microsoft.com/office/powerpoint/2010/main" val="2620307603"/>
+        <p14:creationId xmlns:p14="http://schemas.microsoft.com/office/powerpoint/2010/main" val="3611206107"/>
       </p:ext>
     </p:extLst>
   </p:cSld>
@@ -6801,7 +7980,7 @@
           <a:p>
             <a:r>
               <a:rPr lang="en-US" dirty="0"/>
-              <a:t>Example</a:t>
+              <a:t>How do you compensate for no API?</a:t>
             </a:r>
           </a:p>
         </p:txBody>
@@ -6816,354 +7995,33 @@
             <p:ph idx="1"/>
           </p:nvPr>
         </p:nvSpPr>
-        <p:spPr>
-          <a:xfrm>
-            <a:off x="818712" y="2072081"/>
-            <a:ext cx="10554574" cy="4664279"/>
-          </a:xfrm>
-        </p:spPr>
-        <p:txBody>
-          <a:bodyPr>
-            <a:normAutofit fontScale="85000" lnSpcReduction="20000"/>
-          </a:bodyPr>
-          <a:lstStyle/>
-          <a:p>
-            <a:pPr marL="0" indent="0">
-              <a:buNone/>
-            </a:pPr>
-            <a:r>
-              <a:rPr lang="en-US" sz="1200" dirty="0">
-                <a:latin typeface="Consolas" panose="020B0609020204030204" pitchFamily="49" charset="0"/>
-              </a:rPr>
-              <a:t>using </a:t>
-            </a:r>
-            <a:r>
-              <a:rPr lang="en-US" sz="1200" dirty="0" err="1">
-                <a:latin typeface="Consolas" panose="020B0609020204030204" pitchFamily="49" charset="0"/>
-              </a:rPr>
-              <a:t>UnityEditor</a:t>
-            </a:r>
-            <a:r>
-              <a:rPr lang="en-US" sz="1200" dirty="0">
-                <a:latin typeface="Consolas" panose="020B0609020204030204" pitchFamily="49" charset="0"/>
-              </a:rPr>
-              <a:t>;</a:t>
-            </a:r>
-          </a:p>
-          <a:p>
-            <a:pPr marL="0" indent="0">
-              <a:buNone/>
-            </a:pPr>
-            <a:r>
-              <a:rPr lang="en-US" sz="1200" dirty="0">
-                <a:latin typeface="Consolas" panose="020B0609020204030204" pitchFamily="49" charset="0"/>
-              </a:rPr>
-              <a:t>using </a:t>
-            </a:r>
-            <a:r>
-              <a:rPr lang="en-US" sz="1200" dirty="0" err="1">
-                <a:latin typeface="Consolas" panose="020B0609020204030204" pitchFamily="49" charset="0"/>
-              </a:rPr>
-              <a:t>UnityEditorInternal</a:t>
-            </a:r>
-            <a:r>
-              <a:rPr lang="en-US" sz="1200" dirty="0">
-                <a:latin typeface="Consolas" panose="020B0609020204030204" pitchFamily="49" charset="0"/>
-              </a:rPr>
-              <a:t>;</a:t>
-            </a:r>
-          </a:p>
-          <a:p>
-            <a:pPr marL="0" indent="0">
-              <a:buNone/>
-            </a:pPr>
-            <a:r>
-              <a:rPr lang="en-US" sz="1200" dirty="0">
-                <a:latin typeface="Consolas" panose="020B0609020204030204" pitchFamily="49" charset="0"/>
-              </a:rPr>
-              <a:t>using </a:t>
-            </a:r>
-            <a:r>
-              <a:rPr lang="en-US" sz="1200" dirty="0" err="1">
-                <a:latin typeface="Consolas" panose="020B0609020204030204" pitchFamily="49" charset="0"/>
-              </a:rPr>
-              <a:t>UnityEngine</a:t>
-            </a:r>
-            <a:r>
-              <a:rPr lang="en-US" sz="1200" dirty="0">
-                <a:latin typeface="Consolas" panose="020B0609020204030204" pitchFamily="49" charset="0"/>
-              </a:rPr>
-              <a:t>;</a:t>
-            </a:r>
-          </a:p>
-          <a:p>
-            <a:pPr marL="0" indent="0">
-              <a:buNone/>
-            </a:pPr>
-            <a:endParaRPr lang="en-US" sz="1200" dirty="0">
-              <a:latin typeface="Consolas" panose="020B0609020204030204" pitchFamily="49" charset="0"/>
-            </a:endParaRPr>
-          </a:p>
-          <a:p>
-            <a:pPr marL="0" indent="0">
-              <a:buNone/>
-            </a:pPr>
-            <a:r>
-              <a:rPr lang="en-US" sz="1200" dirty="0">
-                <a:latin typeface="Consolas" panose="020B0609020204030204" pitchFamily="49" charset="0"/>
-              </a:rPr>
-              <a:t>public class </a:t>
-            </a:r>
-            <a:r>
-              <a:rPr lang="en-US" sz="1200" dirty="0" err="1">
-                <a:latin typeface="Consolas" panose="020B0609020204030204" pitchFamily="49" charset="0"/>
-              </a:rPr>
-              <a:t>EditorSample</a:t>
-            </a:r>
-            <a:r>
-              <a:rPr lang="en-US" sz="1200" dirty="0">
-                <a:latin typeface="Consolas" panose="020B0609020204030204" pitchFamily="49" charset="0"/>
-              </a:rPr>
-              <a:t> : Editor {</a:t>
-            </a:r>
-          </a:p>
-          <a:p>
-            <a:pPr marL="0" indent="0">
-              <a:buNone/>
-            </a:pPr>
-            <a:r>
-              <a:rPr lang="en-US" sz="1200" dirty="0">
-                <a:latin typeface="Consolas" panose="020B0609020204030204" pitchFamily="49" charset="0"/>
-              </a:rPr>
-              <a:t>	private </a:t>
-            </a:r>
-            <a:r>
-              <a:rPr lang="en-US" sz="1200" dirty="0" err="1">
-                <a:latin typeface="Consolas" panose="020B0609020204030204" pitchFamily="49" charset="0"/>
-              </a:rPr>
-              <a:t>SerializeProperty</a:t>
-            </a:r>
-            <a:r>
-              <a:rPr lang="en-US" sz="1200" dirty="0">
-                <a:latin typeface="Consolas" panose="020B0609020204030204" pitchFamily="49" charset="0"/>
-              </a:rPr>
-              <a:t> property;</a:t>
-            </a:r>
-          </a:p>
-          <a:p>
-            <a:pPr marL="0" indent="0">
-              <a:buNone/>
-            </a:pPr>
-            <a:r>
-              <a:rPr lang="en-US" sz="1200" dirty="0">
-                <a:latin typeface="Consolas" panose="020B0609020204030204" pitchFamily="49" charset="0"/>
-              </a:rPr>
-              <a:t>	private </a:t>
-            </a:r>
-            <a:r>
-              <a:rPr lang="en-US" sz="1200" dirty="0" err="1">
-                <a:latin typeface="Consolas" panose="020B0609020204030204" pitchFamily="49" charset="0"/>
-              </a:rPr>
-              <a:t>ReordableList</a:t>
-            </a:r>
-            <a:r>
-              <a:rPr lang="en-US" sz="1200" dirty="0">
-                <a:latin typeface="Consolas" panose="020B0609020204030204" pitchFamily="49" charset="0"/>
-              </a:rPr>
-              <a:t> </a:t>
-            </a:r>
-            <a:r>
-              <a:rPr lang="en-US" sz="1200" dirty="0" err="1">
-                <a:latin typeface="Consolas" panose="020B0609020204030204" pitchFamily="49" charset="0"/>
-              </a:rPr>
-              <a:t>propertyList</a:t>
-            </a:r>
-            <a:r>
-              <a:rPr lang="en-US" sz="1200" dirty="0">
-                <a:latin typeface="Consolas" panose="020B0609020204030204" pitchFamily="49" charset="0"/>
-              </a:rPr>
-              <a:t>;</a:t>
-            </a:r>
-          </a:p>
-          <a:p>
-            <a:pPr marL="0" indent="0">
-              <a:buNone/>
-            </a:pPr>
-            <a:r>
-              <a:rPr lang="en-US" sz="1200" dirty="0">
-                <a:latin typeface="Consolas" panose="020B0609020204030204" pitchFamily="49" charset="0"/>
-              </a:rPr>
-              <a:t>	</a:t>
-            </a:r>
-          </a:p>
-          <a:p>
-            <a:pPr marL="0" indent="0">
-              <a:buNone/>
-            </a:pPr>
-            <a:r>
-              <a:rPr lang="en-US" sz="1200" dirty="0">
-                <a:latin typeface="Consolas" panose="020B0609020204030204" pitchFamily="49" charset="0"/>
-              </a:rPr>
-              <a:t>	private void </a:t>
-            </a:r>
-            <a:r>
-              <a:rPr lang="en-US" sz="1200" dirty="0" err="1">
-                <a:latin typeface="Consolas" panose="020B0609020204030204" pitchFamily="49" charset="0"/>
-              </a:rPr>
-              <a:t>OnEnable</a:t>
-            </a:r>
-            <a:r>
-              <a:rPr lang="en-US" sz="1200" dirty="0">
-                <a:latin typeface="Consolas" panose="020B0609020204030204" pitchFamily="49" charset="0"/>
-              </a:rPr>
-              <a:t>() {</a:t>
-            </a:r>
-          </a:p>
-          <a:p>
-            <a:pPr marL="0" indent="0">
-              <a:buNone/>
-            </a:pPr>
-            <a:r>
-              <a:rPr lang="en-US" sz="1200" dirty="0">
-                <a:latin typeface="Consolas" panose="020B0609020204030204" pitchFamily="49" charset="0"/>
-              </a:rPr>
-              <a:t>		// Use for initialization</a:t>
-            </a:r>
-          </a:p>
-          <a:p>
-            <a:pPr marL="0" indent="0">
-              <a:buNone/>
-            </a:pPr>
-            <a:r>
-              <a:rPr lang="en-US" sz="1200" dirty="0">
-                <a:latin typeface="Consolas" panose="020B0609020204030204" pitchFamily="49" charset="0"/>
-              </a:rPr>
-              <a:t>	}</a:t>
-            </a:r>
-          </a:p>
-          <a:p>
-            <a:pPr marL="0" indent="0">
-              <a:buNone/>
-            </a:pPr>
-            <a:endParaRPr lang="en-US" sz="1200" dirty="0">
-              <a:latin typeface="Consolas" panose="020B0609020204030204" pitchFamily="49" charset="0"/>
-            </a:endParaRPr>
-          </a:p>
-          <a:p>
-            <a:pPr marL="0" indent="0">
-              <a:buNone/>
-            </a:pPr>
-            <a:r>
-              <a:rPr lang="en-US" sz="1200" dirty="0">
-                <a:latin typeface="Consolas" panose="020B0609020204030204" pitchFamily="49" charset="0"/>
-              </a:rPr>
-              <a:t>	private void </a:t>
-            </a:r>
-            <a:r>
-              <a:rPr lang="en-US" sz="1200" dirty="0" err="1">
-                <a:latin typeface="Consolas" panose="020B0609020204030204" pitchFamily="49" charset="0"/>
-              </a:rPr>
-              <a:t>OnDisable</a:t>
-            </a:r>
-            <a:r>
-              <a:rPr lang="en-US" sz="1200" dirty="0">
-                <a:latin typeface="Consolas" panose="020B0609020204030204" pitchFamily="49" charset="0"/>
-              </a:rPr>
-              <a:t>() {</a:t>
-            </a:r>
-          </a:p>
-          <a:p>
-            <a:pPr marL="0" indent="0">
-              <a:buNone/>
-            </a:pPr>
-            <a:r>
-              <a:rPr lang="en-US" sz="1200" dirty="0">
-                <a:latin typeface="Consolas" panose="020B0609020204030204" pitchFamily="49" charset="0"/>
-              </a:rPr>
-              <a:t>		// Use as destructor</a:t>
-            </a:r>
-          </a:p>
-          <a:p>
-            <a:pPr marL="0" indent="0">
-              <a:buNone/>
-            </a:pPr>
-            <a:r>
-              <a:rPr lang="en-US" sz="1200" dirty="0">
-                <a:latin typeface="Consolas" panose="020B0609020204030204" pitchFamily="49" charset="0"/>
-              </a:rPr>
-              <a:t>	}</a:t>
-            </a:r>
-          </a:p>
-          <a:p>
-            <a:pPr marL="0" indent="0">
-              <a:buNone/>
-            </a:pPr>
-            <a:endParaRPr lang="en-US" sz="1200" dirty="0">
-              <a:latin typeface="Consolas" panose="020B0609020204030204" pitchFamily="49" charset="0"/>
-            </a:endParaRPr>
-          </a:p>
-          <a:p>
-            <a:pPr marL="0" indent="0">
-              <a:buNone/>
-            </a:pPr>
-            <a:r>
-              <a:rPr lang="en-US" sz="1200" dirty="0">
-                <a:latin typeface="Consolas" panose="020B0609020204030204" pitchFamily="49" charset="0"/>
-              </a:rPr>
-              <a:t>	public override void </a:t>
-            </a:r>
-            <a:r>
-              <a:rPr lang="en-US" sz="1200" dirty="0" err="1">
-                <a:latin typeface="Consolas" panose="020B0609020204030204" pitchFamily="49" charset="0"/>
-              </a:rPr>
-              <a:t>OnInspectorGUI</a:t>
-            </a:r>
-            <a:r>
-              <a:rPr lang="en-US" sz="1200" dirty="0">
-                <a:latin typeface="Consolas" panose="020B0609020204030204" pitchFamily="49" charset="0"/>
-              </a:rPr>
-              <a:t>() {</a:t>
-            </a:r>
-          </a:p>
-          <a:p>
-            <a:pPr marL="0" indent="0">
-              <a:buNone/>
-            </a:pPr>
-            <a:r>
-              <a:rPr lang="en-US" sz="1200" dirty="0">
-                <a:latin typeface="Consolas" panose="020B0609020204030204" pitchFamily="49" charset="0"/>
-              </a:rPr>
-              <a:t>		// Where your main code will go</a:t>
-            </a:r>
-          </a:p>
-          <a:p>
-            <a:pPr marL="0" indent="0">
-              <a:buNone/>
-            </a:pPr>
-            <a:r>
-              <a:rPr lang="en-US" sz="1200" dirty="0">
-                <a:latin typeface="Consolas" panose="020B0609020204030204" pitchFamily="49" charset="0"/>
-              </a:rPr>
-              <a:t>	}</a:t>
-            </a:r>
-          </a:p>
-          <a:p>
-            <a:pPr marL="0" indent="0">
-              <a:buNone/>
-            </a:pPr>
-            <a:r>
-              <a:rPr lang="en-US" sz="1200" dirty="0">
-                <a:latin typeface="Consolas" panose="020B0609020204030204" pitchFamily="49" charset="0"/>
-              </a:rPr>
-              <a:t>}</a:t>
-            </a:r>
+        <p:spPr/>
+        <p:txBody>
+          <a:bodyPr/>
+          <a:lstStyle/>
+          <a:p>
+            <a:r>
+              <a:rPr lang="en-US" dirty="0"/>
+              <a:t>Your IDE (internal development environment) is extremely useful in deconstructing undocumented code</a:t>
+            </a:r>
+          </a:p>
+          <a:p>
+            <a:r>
+              <a:rPr lang="en-US" dirty="0"/>
+              <a:t>Scour the internet, most answers are found on Unity Answers or </a:t>
+            </a:r>
+            <a:r>
+              <a:rPr lang="en-US" dirty="0" err="1"/>
+              <a:t>StackOverflow</a:t>
+            </a:r>
+            <a:endParaRPr lang="en-US" dirty="0"/>
           </a:p>
         </p:txBody>
       </p:sp>
     </p:spTree>
     <p:extLst>
       <p:ext uri="{BB962C8B-B14F-4D97-AF65-F5344CB8AC3E}">
-        <p14:creationId xmlns:p14="http://schemas.microsoft.com/office/powerpoint/2010/main" val="75091960"/>
+        <p14:creationId xmlns:p14="http://schemas.microsoft.com/office/powerpoint/2010/main" val="1129075782"/>
       </p:ext>
     </p:extLst>
   </p:cSld>

</xml_diff>